<commit_message>
aula 02 Python IoT 12032023
</commit_message>
<xml_diff>
--- a/01 Classes/Aula 02 - Aplicação Cloud Indústria 40 Python.pptx
+++ b/01 Classes/Aula 02 - Aplicação Cloud Indústria 40 Python.pptx
@@ -5,18 +5,20 @@
     <p:sldMasterId id="2147483648" r:id="rId1"/>
   </p:sldMasterIdLst>
   <p:notesMasterIdLst>
-    <p:notesMasterId r:id="rId11"/>
+    <p:notesMasterId r:id="rId13"/>
   </p:notesMasterIdLst>
   <p:sldIdLst>
     <p:sldId id="256" r:id="rId2"/>
     <p:sldId id="291" r:id="rId3"/>
-    <p:sldId id="331" r:id="rId4"/>
-    <p:sldId id="347" r:id="rId5"/>
-    <p:sldId id="333" r:id="rId6"/>
-    <p:sldId id="323" r:id="rId7"/>
-    <p:sldId id="345" r:id="rId8"/>
-    <p:sldId id="337" r:id="rId9"/>
-    <p:sldId id="309" r:id="rId10"/>
+    <p:sldId id="348" r:id="rId4"/>
+    <p:sldId id="331" r:id="rId5"/>
+    <p:sldId id="349" r:id="rId6"/>
+    <p:sldId id="347" r:id="rId7"/>
+    <p:sldId id="333" r:id="rId8"/>
+    <p:sldId id="323" r:id="rId9"/>
+    <p:sldId id="345" r:id="rId10"/>
+    <p:sldId id="337" r:id="rId11"/>
+    <p:sldId id="309" r:id="rId12"/>
   </p:sldIdLst>
   <p:sldSz cx="9144000" cy="5143500" type="screen16x9"/>
   <p:notesSz cx="6858000" cy="9144000"/>
@@ -619,7 +621,7 @@
     </p:spTree>
     <p:extLst>
       <p:ext uri="{BB962C8B-B14F-4D97-AF65-F5344CB8AC3E}">
-        <p14:creationId xmlns:p14="http://schemas.microsoft.com/office/powerpoint/2010/main" val="3035753547"/>
+        <p14:creationId xmlns:p14="http://schemas.microsoft.com/office/powerpoint/2010/main" val="2998481219"/>
       </p:ext>
     </p:extLst>
   </p:cSld>
@@ -685,7 +687,7 @@
     </p:spTree>
     <p:extLst>
       <p:ext uri="{BB962C8B-B14F-4D97-AF65-F5344CB8AC3E}">
-        <p14:creationId xmlns:p14="http://schemas.microsoft.com/office/powerpoint/2010/main" val="1662896905"/>
+        <p14:creationId xmlns:p14="http://schemas.microsoft.com/office/powerpoint/2010/main" val="3035753547"/>
       </p:ext>
     </p:extLst>
   </p:cSld>
@@ -751,7 +753,7 @@
     </p:spTree>
     <p:extLst>
       <p:ext uri="{BB962C8B-B14F-4D97-AF65-F5344CB8AC3E}">
-        <p14:creationId xmlns:p14="http://schemas.microsoft.com/office/powerpoint/2010/main" val="585304384"/>
+        <p14:creationId xmlns:p14="http://schemas.microsoft.com/office/powerpoint/2010/main" val="225684915"/>
       </p:ext>
     </p:extLst>
   </p:cSld>
@@ -817,7 +819,7 @@
     </p:spTree>
     <p:extLst>
       <p:ext uri="{BB962C8B-B14F-4D97-AF65-F5344CB8AC3E}">
-        <p14:creationId xmlns:p14="http://schemas.microsoft.com/office/powerpoint/2010/main" val="2709569597"/>
+        <p14:creationId xmlns:p14="http://schemas.microsoft.com/office/powerpoint/2010/main" val="1662896905"/>
       </p:ext>
     </p:extLst>
   </p:cSld>
@@ -883,6 +885,138 @@
     </p:spTree>
     <p:extLst>
       <p:ext uri="{BB962C8B-B14F-4D97-AF65-F5344CB8AC3E}">
+        <p14:creationId xmlns:p14="http://schemas.microsoft.com/office/powerpoint/2010/main" val="585304384"/>
+      </p:ext>
+    </p:extLst>
+  </p:cSld>
+  <p:clrMapOvr>
+    <a:masterClrMapping/>
+  </p:clrMapOvr>
+</p:notes>
+</file>
+
+<file path=ppt/notesSlides/notesSlide7.xml><?xml version="1.0" encoding="utf-8"?>
+<p:notes xmlns:a="http://schemas.openxmlformats.org/drawingml/2006/main" xmlns:r="http://schemas.openxmlformats.org/officeDocument/2006/relationships" xmlns:p="http://schemas.openxmlformats.org/presentationml/2006/main">
+  <p:cSld>
+    <p:spTree>
+      <p:nvGrpSpPr>
+        <p:cNvPr id="1" name=""/>
+        <p:cNvGrpSpPr/>
+        <p:nvPr/>
+      </p:nvGrpSpPr>
+      <p:grpSpPr>
+        <a:xfrm>
+          <a:off x="0" y="0"/>
+          <a:ext cx="0" cy="0"/>
+          <a:chOff x="0" y="0"/>
+          <a:chExt cx="0" cy="0"/>
+        </a:xfrm>
+      </p:grpSpPr>
+      <p:sp>
+        <p:nvSpPr>
+          <p:cNvPr id="2" name="Espaço Reservado para Imagem de Slide 1"/>
+          <p:cNvSpPr>
+            <a:spLocks noGrp="1" noRot="1" noChangeAspect="1"/>
+          </p:cNvSpPr>
+          <p:nvPr>
+            <p:ph type="sldImg"/>
+          </p:nvPr>
+        </p:nvSpPr>
+        <p:spPr>
+          <a:xfrm>
+            <a:off x="381000" y="685800"/>
+            <a:ext cx="6096000" cy="3429000"/>
+          </a:xfrm>
+        </p:spPr>
+      </p:sp>
+      <p:sp>
+        <p:nvSpPr>
+          <p:cNvPr id="3" name="Espaço Reservado para Anotações 2"/>
+          <p:cNvSpPr>
+            <a:spLocks noGrp="1"/>
+          </p:cNvSpPr>
+          <p:nvPr>
+            <p:ph type="body" idx="1"/>
+          </p:nvPr>
+        </p:nvSpPr>
+        <p:spPr/>
+        <p:txBody>
+          <a:bodyPr/>
+          <a:lstStyle/>
+          <a:p>
+            <a:endParaRPr lang="pt-BR" dirty="0"/>
+          </a:p>
+        </p:txBody>
+      </p:sp>
+    </p:spTree>
+    <p:extLst>
+      <p:ext uri="{BB962C8B-B14F-4D97-AF65-F5344CB8AC3E}">
+        <p14:creationId xmlns:p14="http://schemas.microsoft.com/office/powerpoint/2010/main" val="2709569597"/>
+      </p:ext>
+    </p:extLst>
+  </p:cSld>
+  <p:clrMapOvr>
+    <a:masterClrMapping/>
+  </p:clrMapOvr>
+</p:notes>
+</file>
+
+<file path=ppt/notesSlides/notesSlide8.xml><?xml version="1.0" encoding="utf-8"?>
+<p:notes xmlns:a="http://schemas.openxmlformats.org/drawingml/2006/main" xmlns:r="http://schemas.openxmlformats.org/officeDocument/2006/relationships" xmlns:p="http://schemas.openxmlformats.org/presentationml/2006/main">
+  <p:cSld>
+    <p:spTree>
+      <p:nvGrpSpPr>
+        <p:cNvPr id="1" name=""/>
+        <p:cNvGrpSpPr/>
+        <p:nvPr/>
+      </p:nvGrpSpPr>
+      <p:grpSpPr>
+        <a:xfrm>
+          <a:off x="0" y="0"/>
+          <a:ext cx="0" cy="0"/>
+          <a:chOff x="0" y="0"/>
+          <a:chExt cx="0" cy="0"/>
+        </a:xfrm>
+      </p:grpSpPr>
+      <p:sp>
+        <p:nvSpPr>
+          <p:cNvPr id="2" name="Espaço Reservado para Imagem de Slide 1"/>
+          <p:cNvSpPr>
+            <a:spLocks noGrp="1" noRot="1" noChangeAspect="1"/>
+          </p:cNvSpPr>
+          <p:nvPr>
+            <p:ph type="sldImg"/>
+          </p:nvPr>
+        </p:nvSpPr>
+        <p:spPr>
+          <a:xfrm>
+            <a:off x="381000" y="685800"/>
+            <a:ext cx="6096000" cy="3429000"/>
+          </a:xfrm>
+        </p:spPr>
+      </p:sp>
+      <p:sp>
+        <p:nvSpPr>
+          <p:cNvPr id="3" name="Espaço Reservado para Anotações 2"/>
+          <p:cNvSpPr>
+            <a:spLocks noGrp="1"/>
+          </p:cNvSpPr>
+          <p:nvPr>
+            <p:ph type="body" idx="1"/>
+          </p:nvPr>
+        </p:nvSpPr>
+        <p:spPr/>
+        <p:txBody>
+          <a:bodyPr/>
+          <a:lstStyle/>
+          <a:p>
+            <a:endParaRPr lang="pt-BR" dirty="0"/>
+          </a:p>
+        </p:txBody>
+      </p:sp>
+    </p:spTree>
+    <p:extLst>
+      <p:ext uri="{BB962C8B-B14F-4D97-AF65-F5344CB8AC3E}">
         <p14:creationId xmlns:p14="http://schemas.microsoft.com/office/powerpoint/2010/main" val="3863516043"/>
       </p:ext>
     </p:extLst>
@@ -893,7 +1027,7 @@
 </p:notes>
 </file>
 
-<file path=ppt/notesSlides/notesSlide7.xml><?xml version="1.0" encoding="utf-8"?>
+<file path=ppt/notesSlides/notesSlide9.xml><?xml version="1.0" encoding="utf-8"?>
 <p:notes xmlns:a="http://schemas.openxmlformats.org/drawingml/2006/main" xmlns:r="http://schemas.openxmlformats.org/officeDocument/2006/relationships" xmlns:p="http://schemas.openxmlformats.org/presentationml/2006/main">
   <p:cSld>
     <p:spTree>
@@ -3896,7 +4030,173 @@
 </p:sld>
 </file>
 
-<file path=ppt/slides/slide2.xml><?xml version="1.0" encoding="utf-8"?>
+<file path=ppt/slides/slide10.xml><?xml version="1.0" encoding="utf-8"?>
+<p:sld xmlns:a="http://schemas.openxmlformats.org/drawingml/2006/main" xmlns:r="http://schemas.openxmlformats.org/officeDocument/2006/relationships" xmlns:p="http://schemas.openxmlformats.org/presentationml/2006/main">
+  <p:cSld>
+    <p:spTree>
+      <p:nvGrpSpPr>
+        <p:cNvPr id="1" name=""/>
+        <p:cNvGrpSpPr/>
+        <p:nvPr/>
+      </p:nvGrpSpPr>
+      <p:grpSpPr>
+        <a:xfrm>
+          <a:off x="0" y="0"/>
+          <a:ext cx="0" cy="0"/>
+          <a:chOff x="0" y="0"/>
+          <a:chExt cx="0" cy="0"/>
+        </a:xfrm>
+      </p:grpSpPr>
+      <p:sp>
+        <p:nvSpPr>
+          <p:cNvPr id="6" name="Title 1"/>
+          <p:cNvSpPr>
+            <a:spLocks noGrp="1"/>
+          </p:cNvSpPr>
+          <p:nvPr>
+            <p:ph type="title"/>
+          </p:nvPr>
+        </p:nvSpPr>
+        <p:spPr>
+          <a:xfrm>
+            <a:off x="457200" y="205980"/>
+            <a:ext cx="8229600" cy="857251"/>
+          </a:xfrm>
+        </p:spPr>
+        <p:txBody>
+          <a:bodyPr>
+            <a:normAutofit/>
+          </a:bodyPr>
+          <a:lstStyle/>
+          <a:p>
+            <a:r>
+              <a:rPr lang="en-US" b="1" dirty="0" err="1">
+                <a:solidFill>
+                  <a:srgbClr val="0070C0"/>
+                </a:solidFill>
+              </a:rPr>
+              <a:t>Referências</a:t>
+            </a:r>
+            <a:r>
+              <a:rPr lang="en-US" b="1" dirty="0">
+                <a:solidFill>
+                  <a:srgbClr val="0070C0"/>
+                </a:solidFill>
+              </a:rPr>
+              <a:t> </a:t>
+            </a:r>
+            <a:r>
+              <a:rPr lang="en-US" b="1" dirty="0" err="1">
+                <a:solidFill>
+                  <a:srgbClr val="0070C0"/>
+                </a:solidFill>
+              </a:rPr>
+              <a:t>Bibliográficas</a:t>
+            </a:r>
+            <a:endParaRPr lang="en-US" b="1" dirty="0">
+              <a:solidFill>
+                <a:srgbClr val="0070C0"/>
+              </a:solidFill>
+            </a:endParaRPr>
+          </a:p>
+        </p:txBody>
+      </p:sp>
+      <p:sp>
+        <p:nvSpPr>
+          <p:cNvPr id="8" name="Text Placeholder 2"/>
+          <p:cNvSpPr>
+            <a:spLocks noGrp="1"/>
+          </p:cNvSpPr>
+          <p:nvPr>
+            <p:ph type="body" sz="half" idx="1"/>
+          </p:nvPr>
+        </p:nvSpPr>
+        <p:spPr>
+          <a:xfrm>
+            <a:off x="142865" y="1200151"/>
+            <a:ext cx="8865056" cy="3394472"/>
+          </a:xfrm>
+        </p:spPr>
+        <p:txBody>
+          <a:bodyPr>
+            <a:noAutofit/>
+          </a:bodyPr>
+          <a:lstStyle/>
+          <a:p>
+            <a:pPr marL="0" indent="0" algn="just">
+              <a:buNone/>
+            </a:pPr>
+            <a:r>
+              <a:rPr lang="pt-BR" sz="2000" dirty="0">
+                <a:latin typeface="Times New Roman" panose="02020603050405020304" pitchFamily="18" charset="0"/>
+                <a:cs typeface="Times New Roman" panose="02020603050405020304" pitchFamily="18" charset="0"/>
+              </a:rPr>
+              <a:t>[1] .</a:t>
+            </a:r>
+          </a:p>
+          <a:p>
+            <a:pPr marL="0" indent="0" algn="just">
+              <a:buNone/>
+            </a:pPr>
+            <a:endParaRPr lang="pt-BR" sz="2000" dirty="0">
+              <a:latin typeface="Times New Roman" panose="02020603050405020304" pitchFamily="18" charset="0"/>
+              <a:cs typeface="Times New Roman" panose="02020603050405020304" pitchFamily="18" charset="0"/>
+            </a:endParaRPr>
+          </a:p>
+          <a:p>
+            <a:pPr marL="0" indent="0" algn="just">
+              <a:buNone/>
+            </a:pPr>
+            <a:r>
+              <a:rPr lang="pt-BR" sz="2000" dirty="0">
+                <a:latin typeface="Times New Roman" panose="02020603050405020304" pitchFamily="18" charset="0"/>
+                <a:cs typeface="Times New Roman" panose="02020603050405020304" pitchFamily="18" charset="0"/>
+              </a:rPr>
+              <a:t>[2] </a:t>
+            </a:r>
+            <a:r>
+              <a:rPr lang="pt-BR" sz="2000" dirty="0">
+                <a:latin typeface="Calibri" panose="020F0502020204030204" pitchFamily="34" charset="0"/>
+              </a:rPr>
+              <a:t>.</a:t>
+            </a:r>
+          </a:p>
+          <a:p>
+            <a:pPr marL="0" indent="0" algn="just">
+              <a:buNone/>
+            </a:pPr>
+            <a:endParaRPr lang="pt-BR" sz="2000" dirty="0">
+              <a:latin typeface="Calibri" panose="020F0502020204030204" pitchFamily="34" charset="0"/>
+            </a:endParaRPr>
+          </a:p>
+          <a:p>
+            <a:pPr marL="0" indent="0" algn="just">
+              <a:buNone/>
+            </a:pPr>
+            <a:r>
+              <a:rPr lang="pt-BR" sz="2000" dirty="0">
+                <a:latin typeface="Calibri" panose="020F0502020204030204" pitchFamily="34" charset="0"/>
+              </a:rPr>
+              <a:t>[3] .</a:t>
+            </a:r>
+          </a:p>
+        </p:txBody>
+      </p:sp>
+    </p:spTree>
+    <p:extLst>
+      <p:ext uri="{BB962C8B-B14F-4D97-AF65-F5344CB8AC3E}">
+        <p14:creationId xmlns:p14="http://schemas.microsoft.com/office/powerpoint/2010/main" val="1115311843"/>
+      </p:ext>
+    </p:extLst>
+  </p:cSld>
+  <p:clrMapOvr>
+    <a:masterClrMapping/>
+  </p:clrMapOvr>
+  <p:transition spd="med"/>
+</p:sld>
+</file>
+
+<file path=ppt/slides/slide11.xml><?xml version="1.0" encoding="utf-8"?>
 <p:sld xmlns:a="http://schemas.openxmlformats.org/drawingml/2006/main" xmlns:r="http://schemas.openxmlformats.org/officeDocument/2006/relationships" xmlns:p="http://schemas.openxmlformats.org/presentationml/2006/main">
   <p:cSld>
     <p:spTree>
@@ -3922,7 +4222,7 @@
           <p:nvPr/>
         </p:nvPicPr>
         <p:blipFill>
-          <a:blip r:embed="rId3"/>
+          <a:blip r:embed="rId2"/>
           <a:stretch>
             <a:fillRect/>
           </a:stretch>
@@ -3951,7 +4251,7 @@
           <p:nvPr/>
         </p:nvPicPr>
         <p:blipFill>
-          <a:blip r:embed="rId4"/>
+          <a:blip r:embed="rId3"/>
           <a:stretch>
             <a:fillRect/>
           </a:stretch>
@@ -3983,8 +4283,8 @@
         </p:nvSpPr>
         <p:spPr>
           <a:xfrm>
-            <a:off x="348258" y="2277667"/>
-            <a:ext cx="8681444" cy="1102519"/>
+            <a:off x="285751" y="2386770"/>
+            <a:ext cx="8615364" cy="1102519"/>
           </a:xfrm>
         </p:spPr>
         <p:txBody>
@@ -3993,44 +4293,13 @@
           </a:bodyPr>
           <a:lstStyle/>
           <a:p>
-            <a:pPr algn="l"/>
-            <a:br>
-              <a:rPr lang="pt-BR" b="1" dirty="0">
+            <a:r>
+              <a:rPr lang="pt-BR" sz="4800" b="1" dirty="0">
                 <a:solidFill>
                   <a:schemeClr val="bg1"/>
                 </a:solidFill>
               </a:rPr>
-            </a:br>
-            <a:r>
-              <a:rPr lang="pt-BR" b="1" dirty="0">
-                <a:solidFill>
-                  <a:schemeClr val="bg1"/>
-                </a:solidFill>
-              </a:rPr>
-              <a:t>Aula 02</a:t>
-            </a:r>
-            <a:br>
-              <a:rPr lang="pt-BR" b="1" dirty="0">
-                <a:solidFill>
-                  <a:schemeClr val="bg1"/>
-                </a:solidFill>
-              </a:rPr>
-            </a:br>
-            <a:r>
-              <a:rPr lang="pt-BR" b="1" dirty="0">
-                <a:solidFill>
-                  <a:schemeClr val="bg1"/>
-                </a:solidFill>
-              </a:rPr>
-              <a:t>	</a:t>
-            </a:r>
-            <a:r>
-              <a:rPr lang="pt-BR" sz="3600" b="1" dirty="0">
-                <a:solidFill>
-                  <a:schemeClr val="bg1"/>
-                </a:solidFill>
-              </a:rPr>
-              <a:t>Plataformas Middleware e Protocolos IOT</a:t>
+              <a:t>Aplicação Cloud Indústria 40 Python</a:t>
             </a:r>
           </a:p>
         </p:txBody>
@@ -4322,12 +4591,12 @@
               <a:t>Professor </a:t>
             </a:r>
             <a:r>
-              <a:rPr lang="pt-BR" sz="2000" b="1" dirty="0" err="1">
+              <a:rPr lang="pt-BR" sz="2000" b="1">
                 <a:solidFill>
                   <a:schemeClr val="bg1"/>
                 </a:solidFill>
               </a:rPr>
-              <a:t>MSc</a:t>
+              <a:t>M.Sc</a:t>
             </a:r>
             <a:r>
               <a:rPr lang="pt-BR" sz="2000" b="1" dirty="0">
@@ -4342,10 +4611,10 @@
       </p:sp>
       <p:pic>
         <p:nvPicPr>
-          <p:cNvPr id="4" name="Google Shape;62;p1" descr="Imagem">
+          <p:cNvPr id="2" name="Google Shape;62;p1" descr="Imagem">
             <a:extLst>
               <a:ext uri="{FF2B5EF4-FFF2-40B4-BE49-F238E27FC236}">
-                <a16:creationId xmlns:a16="http://schemas.microsoft.com/office/drawing/2014/main" id="{652F850C-6AD9-5CD4-839F-152858F13612}"/>
+                <a16:creationId xmlns:a16="http://schemas.microsoft.com/office/drawing/2014/main" id="{9C895622-2963-024D-634E-EA58F5381D06}"/>
               </a:ext>
             </a:extLst>
           </p:cNvPr>
@@ -4353,7 +4622,7 @@
           <p:nvPr/>
         </p:nvPicPr>
         <p:blipFill rotWithShape="1">
-          <a:blip r:embed="rId5">
+          <a:blip r:embed="rId4">
             <a:alphaModFix/>
           </a:blip>
           <a:srcRect/>
@@ -4382,1081 +4651,7 @@
 </p:sld>
 </file>
 
-<file path=ppt/slides/slide3.xml><?xml version="1.0" encoding="utf-8"?>
-<p:sld xmlns:a="http://schemas.openxmlformats.org/drawingml/2006/main" xmlns:r="http://schemas.openxmlformats.org/officeDocument/2006/relationships" xmlns:p="http://schemas.openxmlformats.org/presentationml/2006/main">
-  <p:cSld>
-    <p:spTree>
-      <p:nvGrpSpPr>
-        <p:cNvPr id="1" name=""/>
-        <p:cNvGrpSpPr/>
-        <p:nvPr/>
-      </p:nvGrpSpPr>
-      <p:grpSpPr>
-        <a:xfrm>
-          <a:off x="0" y="0"/>
-          <a:ext cx="0" cy="0"/>
-          <a:chOff x="0" y="0"/>
-          <a:chExt cx="0" cy="0"/>
-        </a:xfrm>
-      </p:grpSpPr>
-      <p:sp>
-        <p:nvSpPr>
-          <p:cNvPr id="6" name="Title 1"/>
-          <p:cNvSpPr>
-            <a:spLocks noGrp="1"/>
-          </p:cNvSpPr>
-          <p:nvPr>
-            <p:ph type="title"/>
-          </p:nvPr>
-        </p:nvSpPr>
-        <p:spPr>
-          <a:xfrm>
-            <a:off x="457200" y="205980"/>
-            <a:ext cx="8229600" cy="857251"/>
-          </a:xfrm>
-        </p:spPr>
-        <p:txBody>
-          <a:bodyPr>
-            <a:normAutofit/>
-          </a:bodyPr>
-          <a:lstStyle/>
-          <a:p>
-            <a:r>
-              <a:rPr lang="pt-BR" b="1" dirty="0">
-                <a:solidFill>
-                  <a:srgbClr val="0070C0"/>
-                </a:solidFill>
-              </a:rPr>
-              <a:t>Plataformas Middleware</a:t>
-            </a:r>
-            <a:endParaRPr lang="en-US" b="1" dirty="0">
-              <a:solidFill>
-                <a:srgbClr val="0070C0"/>
-              </a:solidFill>
-            </a:endParaRPr>
-          </a:p>
-        </p:txBody>
-      </p:sp>
-      <p:sp>
-        <p:nvSpPr>
-          <p:cNvPr id="8" name="Text Placeholder 2"/>
-          <p:cNvSpPr>
-            <a:spLocks noGrp="1"/>
-          </p:cNvSpPr>
-          <p:nvPr>
-            <p:ph type="body" sz="half" idx="1"/>
-          </p:nvPr>
-        </p:nvSpPr>
-        <p:spPr>
-          <a:xfrm>
-            <a:off x="142865" y="1200150"/>
-            <a:ext cx="8865056" cy="3737370"/>
-          </a:xfrm>
-        </p:spPr>
-        <p:txBody>
-          <a:bodyPr>
-            <a:noAutofit/>
-          </a:bodyPr>
-          <a:lstStyle/>
-          <a:p>
-            <a:pPr marL="0" indent="0" algn="just">
-              <a:buNone/>
-            </a:pPr>
-            <a:r>
-              <a:rPr lang="pt-BR" sz="1400" dirty="0"/>
-              <a:t>ETAPAS</a:t>
-            </a:r>
-            <a:endParaRPr lang="pt-BR" sz="2000" dirty="0">
-              <a:solidFill>
-                <a:schemeClr val="tx1"/>
-              </a:solidFill>
-              <a:latin typeface="Times New Roman" panose="02020603050405020304" pitchFamily="18" charset="0"/>
-              <a:cs typeface="Times New Roman" panose="02020603050405020304" pitchFamily="18" charset="0"/>
-            </a:endParaRPr>
-          </a:p>
-        </p:txBody>
-      </p:sp>
-    </p:spTree>
-    <p:extLst>
-      <p:ext uri="{BB962C8B-B14F-4D97-AF65-F5344CB8AC3E}">
-        <p14:creationId xmlns:p14="http://schemas.microsoft.com/office/powerpoint/2010/main" val="1362980025"/>
-      </p:ext>
-    </p:extLst>
-  </p:cSld>
-  <p:clrMapOvr>
-    <a:masterClrMapping/>
-  </p:clrMapOvr>
-  <p:transition spd="med"/>
-</p:sld>
-</file>
-
-<file path=ppt/slides/slide4.xml><?xml version="1.0" encoding="utf-8"?>
-<p:sld xmlns:a="http://schemas.openxmlformats.org/drawingml/2006/main" xmlns:r="http://schemas.openxmlformats.org/officeDocument/2006/relationships" xmlns:p="http://schemas.openxmlformats.org/presentationml/2006/main">
-  <p:cSld>
-    <p:spTree>
-      <p:nvGrpSpPr>
-        <p:cNvPr id="1" name=""/>
-        <p:cNvGrpSpPr/>
-        <p:nvPr/>
-      </p:nvGrpSpPr>
-      <p:grpSpPr>
-        <a:xfrm>
-          <a:off x="0" y="0"/>
-          <a:ext cx="0" cy="0"/>
-          <a:chOff x="0" y="0"/>
-          <a:chExt cx="0" cy="0"/>
-        </a:xfrm>
-      </p:grpSpPr>
-      <p:sp>
-        <p:nvSpPr>
-          <p:cNvPr id="6" name="Title 1"/>
-          <p:cNvSpPr>
-            <a:spLocks noGrp="1"/>
-          </p:cNvSpPr>
-          <p:nvPr>
-            <p:ph type="title"/>
-          </p:nvPr>
-        </p:nvSpPr>
-        <p:spPr>
-          <a:xfrm>
-            <a:off x="457200" y="205980"/>
-            <a:ext cx="8229600" cy="857251"/>
-          </a:xfrm>
-        </p:spPr>
-        <p:txBody>
-          <a:bodyPr>
-            <a:normAutofit/>
-          </a:bodyPr>
-          <a:lstStyle/>
-          <a:p>
-            <a:r>
-              <a:rPr lang="pt-BR" b="1" dirty="0">
-                <a:solidFill>
-                  <a:srgbClr val="0070C0"/>
-                </a:solidFill>
-              </a:rPr>
-              <a:t>Protocolos de Rede para IOT</a:t>
-            </a:r>
-            <a:endParaRPr lang="en-US" b="1" dirty="0">
-              <a:solidFill>
-                <a:srgbClr val="0070C0"/>
-              </a:solidFill>
-            </a:endParaRPr>
-          </a:p>
-        </p:txBody>
-      </p:sp>
-      <p:sp>
-        <p:nvSpPr>
-          <p:cNvPr id="8" name="Text Placeholder 2"/>
-          <p:cNvSpPr>
-            <a:spLocks noGrp="1"/>
-          </p:cNvSpPr>
-          <p:nvPr>
-            <p:ph type="body" sz="half" idx="1"/>
-          </p:nvPr>
-        </p:nvSpPr>
-        <p:spPr>
-          <a:xfrm>
-            <a:off x="142865" y="1200150"/>
-            <a:ext cx="8865056" cy="3737370"/>
-          </a:xfrm>
-        </p:spPr>
-        <p:txBody>
-          <a:bodyPr>
-            <a:noAutofit/>
-          </a:bodyPr>
-          <a:lstStyle/>
-          <a:p>
-            <a:pPr marL="0" indent="0" algn="just">
-              <a:buNone/>
-            </a:pPr>
-            <a:r>
-              <a:rPr lang="pt-BR" sz="1400" dirty="0"/>
-              <a:t>ETAPAS</a:t>
-            </a:r>
-            <a:endParaRPr lang="pt-BR" sz="2000" dirty="0">
-              <a:solidFill>
-                <a:schemeClr val="tx1"/>
-              </a:solidFill>
-              <a:latin typeface="Times New Roman" panose="02020603050405020304" pitchFamily="18" charset="0"/>
-              <a:cs typeface="Times New Roman" panose="02020603050405020304" pitchFamily="18" charset="0"/>
-            </a:endParaRPr>
-          </a:p>
-        </p:txBody>
-      </p:sp>
-    </p:spTree>
-    <p:extLst>
-      <p:ext uri="{BB962C8B-B14F-4D97-AF65-F5344CB8AC3E}">
-        <p14:creationId xmlns:p14="http://schemas.microsoft.com/office/powerpoint/2010/main" val="1754424786"/>
-      </p:ext>
-    </p:extLst>
-  </p:cSld>
-  <p:clrMapOvr>
-    <a:masterClrMapping/>
-  </p:clrMapOvr>
-  <p:transition spd="med"/>
-</p:sld>
-</file>
-
-<file path=ppt/slides/slide5.xml><?xml version="1.0" encoding="utf-8"?>
-<p:sld xmlns:a="http://schemas.openxmlformats.org/drawingml/2006/main" xmlns:r="http://schemas.openxmlformats.org/officeDocument/2006/relationships" xmlns:p="http://schemas.openxmlformats.org/presentationml/2006/main">
-  <p:cSld>
-    <p:spTree>
-      <p:nvGrpSpPr>
-        <p:cNvPr id="1" name=""/>
-        <p:cNvGrpSpPr/>
-        <p:nvPr/>
-      </p:nvGrpSpPr>
-      <p:grpSpPr>
-        <a:xfrm>
-          <a:off x="0" y="0"/>
-          <a:ext cx="0" cy="0"/>
-          <a:chOff x="0" y="0"/>
-          <a:chExt cx="0" cy="0"/>
-        </a:xfrm>
-      </p:grpSpPr>
-      <p:sp>
-        <p:nvSpPr>
-          <p:cNvPr id="6" name="Title 1"/>
-          <p:cNvSpPr>
-            <a:spLocks noGrp="1"/>
-          </p:cNvSpPr>
-          <p:nvPr>
-            <p:ph type="title"/>
-          </p:nvPr>
-        </p:nvSpPr>
-        <p:spPr>
-          <a:xfrm>
-            <a:off x="457200" y="205980"/>
-            <a:ext cx="8229600" cy="857251"/>
-          </a:xfrm>
-        </p:spPr>
-        <p:txBody>
-          <a:bodyPr>
-            <a:normAutofit/>
-          </a:bodyPr>
-          <a:lstStyle/>
-          <a:p>
-            <a:r>
-              <a:rPr lang="en-US" b="1" dirty="0" err="1">
-                <a:solidFill>
-                  <a:srgbClr val="0070C0"/>
-                </a:solidFill>
-              </a:rPr>
-              <a:t>Leitura</a:t>
-            </a:r>
-            <a:r>
-              <a:rPr lang="en-US" b="1" dirty="0">
-                <a:solidFill>
-                  <a:srgbClr val="0070C0"/>
-                </a:solidFill>
-              </a:rPr>
-              <a:t> </a:t>
-            </a:r>
-            <a:r>
-              <a:rPr lang="en-US" b="1" dirty="0" err="1">
-                <a:solidFill>
-                  <a:srgbClr val="0070C0"/>
-                </a:solidFill>
-              </a:rPr>
-              <a:t>Específica</a:t>
-            </a:r>
-            <a:endParaRPr lang="en-US" b="1" dirty="0">
-              <a:solidFill>
-                <a:srgbClr val="0070C0"/>
-              </a:solidFill>
-            </a:endParaRPr>
-          </a:p>
-        </p:txBody>
-      </p:sp>
-      <p:sp>
-        <p:nvSpPr>
-          <p:cNvPr id="8" name="Text Placeholder 2"/>
-          <p:cNvSpPr>
-            <a:spLocks noGrp="1"/>
-          </p:cNvSpPr>
-          <p:nvPr>
-            <p:ph type="body" sz="half" idx="1"/>
-          </p:nvPr>
-        </p:nvSpPr>
-        <p:spPr>
-          <a:xfrm>
-            <a:off x="142865" y="1200151"/>
-            <a:ext cx="8865056" cy="3394472"/>
-          </a:xfrm>
-        </p:spPr>
-        <p:txBody>
-          <a:bodyPr>
-            <a:noAutofit/>
-          </a:bodyPr>
-          <a:lstStyle/>
-          <a:p>
-            <a:pPr marL="0" indent="0" algn="just">
-              <a:buNone/>
-            </a:pPr>
-            <a:r>
-              <a:rPr lang="pt-BR" sz="2400" dirty="0">
-                <a:latin typeface="Times New Roman" panose="02020603050405020304" pitchFamily="18" charset="0"/>
-                <a:cs typeface="Times New Roman" panose="02020603050405020304" pitchFamily="18" charset="0"/>
-              </a:rPr>
-              <a:t>[1] Plataformas de Middleware para IOT em Python.</a:t>
-            </a:r>
-          </a:p>
-          <a:p>
-            <a:pPr marL="0" indent="0" algn="just">
-              <a:buNone/>
-            </a:pPr>
-            <a:r>
-              <a:rPr lang="pt-BR" sz="2400" b="1" dirty="0">
-                <a:solidFill>
-                  <a:srgbClr val="FF0000"/>
-                </a:solidFill>
-                <a:latin typeface="Times New Roman" panose="02020603050405020304" pitchFamily="18" charset="0"/>
-                <a:cs typeface="Times New Roman" panose="02020603050405020304" pitchFamily="18" charset="0"/>
-              </a:rPr>
-              <a:t>Disponível em: </a:t>
-            </a:r>
-            <a:r>
-              <a:rPr lang="pt-BR" sz="2400" dirty="0">
-                <a:latin typeface="Times New Roman" panose="02020603050405020304" pitchFamily="18" charset="0"/>
-                <a:cs typeface="Times New Roman" panose="02020603050405020304" pitchFamily="18" charset="0"/>
-                <a:hlinkClick r:id="rId3"/>
-              </a:rPr>
-              <a:t>https://</a:t>
-            </a:r>
-            <a:endParaRPr lang="pt-BR" sz="2400" dirty="0">
-              <a:latin typeface="Times New Roman" panose="02020603050405020304" pitchFamily="18" charset="0"/>
-              <a:cs typeface="Times New Roman" panose="02020603050405020304" pitchFamily="18" charset="0"/>
-            </a:endParaRPr>
-          </a:p>
-          <a:p>
-            <a:pPr marL="0" indent="0" algn="just">
-              <a:buNone/>
-            </a:pPr>
-            <a:endParaRPr lang="pt-BR" sz="2400" dirty="0">
-              <a:latin typeface="Times New Roman" panose="02020603050405020304" pitchFamily="18" charset="0"/>
-              <a:cs typeface="Times New Roman" panose="02020603050405020304" pitchFamily="18" charset="0"/>
-            </a:endParaRPr>
-          </a:p>
-          <a:p>
-            <a:pPr marL="0" indent="0" algn="just">
-              <a:buNone/>
-            </a:pPr>
-            <a:r>
-              <a:rPr lang="pt-BR" sz="2400" dirty="0">
-                <a:latin typeface="Times New Roman" panose="02020603050405020304" pitchFamily="18" charset="0"/>
-                <a:cs typeface="Times New Roman" panose="02020603050405020304" pitchFamily="18" charset="0"/>
-              </a:rPr>
-              <a:t>[2] Protocolos de Rede para IOT em Python. </a:t>
-            </a:r>
-          </a:p>
-          <a:p>
-            <a:pPr marL="0" indent="0" algn="just">
-              <a:buNone/>
-            </a:pPr>
-            <a:r>
-              <a:rPr lang="pt-BR" sz="2400" b="1" dirty="0">
-                <a:solidFill>
-                  <a:srgbClr val="FF0000"/>
-                </a:solidFill>
-                <a:latin typeface="Times New Roman" panose="02020603050405020304" pitchFamily="18" charset="0"/>
-                <a:cs typeface="Times New Roman" panose="02020603050405020304" pitchFamily="18" charset="0"/>
-              </a:rPr>
-              <a:t>Disponível em: </a:t>
-            </a:r>
-            <a:r>
-              <a:rPr lang="pt-BR" sz="2400" dirty="0">
-                <a:latin typeface="Times New Roman" panose="02020603050405020304" pitchFamily="18" charset="0"/>
-                <a:cs typeface="Times New Roman" panose="02020603050405020304" pitchFamily="18" charset="0"/>
-                <a:hlinkClick r:id="rId4"/>
-              </a:rPr>
-              <a:t>https:</a:t>
-            </a:r>
-            <a:r>
-              <a:rPr lang="pt-BR" sz="2400" dirty="0">
-                <a:latin typeface="Times New Roman" panose="02020603050405020304" pitchFamily="18" charset="0"/>
-                <a:cs typeface="Times New Roman" panose="02020603050405020304" pitchFamily="18" charset="0"/>
-              </a:rPr>
-              <a:t>//</a:t>
-            </a:r>
-          </a:p>
-          <a:p>
-            <a:pPr marL="0" indent="0" algn="just">
-              <a:buNone/>
-            </a:pPr>
-            <a:endParaRPr lang="pt-BR" sz="2400" dirty="0">
-              <a:latin typeface="Times New Roman" panose="02020603050405020304" pitchFamily="18" charset="0"/>
-              <a:cs typeface="Times New Roman" panose="02020603050405020304" pitchFamily="18" charset="0"/>
-            </a:endParaRPr>
-          </a:p>
-          <a:p>
-            <a:pPr marL="0" indent="0" algn="just">
-              <a:buNone/>
-            </a:pPr>
-            <a:endParaRPr lang="pt-BR" sz="2400" dirty="0">
-              <a:latin typeface="Times New Roman" panose="02020603050405020304" pitchFamily="18" charset="0"/>
-              <a:cs typeface="Times New Roman" panose="02020603050405020304" pitchFamily="18" charset="0"/>
-            </a:endParaRPr>
-          </a:p>
-          <a:p>
-            <a:pPr marL="0" indent="0" algn="just">
-              <a:buNone/>
-            </a:pPr>
-            <a:endParaRPr lang="pt-BR" sz="2400" dirty="0">
-              <a:latin typeface="Times New Roman" panose="02020603050405020304" pitchFamily="18" charset="0"/>
-              <a:cs typeface="Times New Roman" panose="02020603050405020304" pitchFamily="18" charset="0"/>
-            </a:endParaRPr>
-          </a:p>
-          <a:p>
-            <a:pPr marL="0" indent="0" algn="just">
-              <a:buNone/>
-            </a:pPr>
-            <a:endParaRPr lang="pt-BR" sz="2400" dirty="0">
-              <a:latin typeface="Calibri" panose="020F0502020204030204" pitchFamily="34" charset="0"/>
-            </a:endParaRPr>
-          </a:p>
-        </p:txBody>
-      </p:sp>
-    </p:spTree>
-    <p:extLst>
-      <p:ext uri="{BB962C8B-B14F-4D97-AF65-F5344CB8AC3E}">
-        <p14:creationId xmlns:p14="http://schemas.microsoft.com/office/powerpoint/2010/main" val="3680270425"/>
-      </p:ext>
-    </p:extLst>
-  </p:cSld>
-  <p:clrMapOvr>
-    <a:masterClrMapping/>
-  </p:clrMapOvr>
-  <p:transition spd="med"/>
-</p:sld>
-</file>
-
-<file path=ppt/slides/slide6.xml><?xml version="1.0" encoding="utf-8"?>
-<p:sld xmlns:a="http://schemas.openxmlformats.org/drawingml/2006/main" xmlns:r="http://schemas.openxmlformats.org/officeDocument/2006/relationships" xmlns:p="http://schemas.openxmlformats.org/presentationml/2006/main">
-  <p:cSld>
-    <p:spTree>
-      <p:nvGrpSpPr>
-        <p:cNvPr id="1" name=""/>
-        <p:cNvGrpSpPr/>
-        <p:nvPr/>
-      </p:nvGrpSpPr>
-      <p:grpSpPr>
-        <a:xfrm>
-          <a:off x="0" y="0"/>
-          <a:ext cx="0" cy="0"/>
-          <a:chOff x="0" y="0"/>
-          <a:chExt cx="0" cy="0"/>
-        </a:xfrm>
-      </p:grpSpPr>
-      <p:sp>
-        <p:nvSpPr>
-          <p:cNvPr id="6" name="Title 1"/>
-          <p:cNvSpPr>
-            <a:spLocks noGrp="1"/>
-          </p:cNvSpPr>
-          <p:nvPr>
-            <p:ph type="title"/>
-          </p:nvPr>
-        </p:nvSpPr>
-        <p:spPr>
-          <a:xfrm>
-            <a:off x="457200" y="205980"/>
-            <a:ext cx="8229600" cy="857251"/>
-          </a:xfrm>
-        </p:spPr>
-        <p:txBody>
-          <a:bodyPr>
-            <a:normAutofit/>
-          </a:bodyPr>
-          <a:lstStyle/>
-          <a:p>
-            <a:r>
-              <a:rPr lang="en-US" b="1" dirty="0" err="1">
-                <a:solidFill>
-                  <a:srgbClr val="0070C0"/>
-                </a:solidFill>
-              </a:rPr>
-              <a:t>Aprenda</a:t>
-            </a:r>
-            <a:r>
-              <a:rPr lang="en-US" b="1" dirty="0">
-                <a:solidFill>
-                  <a:srgbClr val="0070C0"/>
-                </a:solidFill>
-              </a:rPr>
-              <a:t>+</a:t>
-            </a:r>
-          </a:p>
-        </p:txBody>
-      </p:sp>
-      <p:sp>
-        <p:nvSpPr>
-          <p:cNvPr id="8" name="Text Placeholder 2"/>
-          <p:cNvSpPr>
-            <a:spLocks noGrp="1"/>
-          </p:cNvSpPr>
-          <p:nvPr>
-            <p:ph type="body" sz="half" idx="1"/>
-          </p:nvPr>
-        </p:nvSpPr>
-        <p:spPr>
-          <a:xfrm>
-            <a:off x="142865" y="1200150"/>
-            <a:ext cx="8865056" cy="3737370"/>
-          </a:xfrm>
-        </p:spPr>
-        <p:txBody>
-          <a:bodyPr>
-            <a:noAutofit/>
-          </a:bodyPr>
-          <a:lstStyle/>
-          <a:p>
-            <a:pPr marL="0" indent="0" algn="just">
-              <a:buNone/>
-            </a:pPr>
-            <a:r>
-              <a:rPr lang="pt-BR" sz="2400" dirty="0">
-                <a:latin typeface="Times New Roman" panose="02020603050405020304" pitchFamily="18" charset="0"/>
-                <a:cs typeface="Times New Roman" panose="02020603050405020304" pitchFamily="18" charset="0"/>
-              </a:rPr>
-              <a:t>[1] Plataformas de Middleware para IOT em Python.</a:t>
-            </a:r>
-          </a:p>
-          <a:p>
-            <a:pPr marL="0" indent="0" algn="just">
-              <a:buNone/>
-            </a:pPr>
-            <a:r>
-              <a:rPr lang="pt-BR" sz="2400" b="1" dirty="0">
-                <a:solidFill>
-                  <a:srgbClr val="FF0000"/>
-                </a:solidFill>
-                <a:latin typeface="Times New Roman" panose="02020603050405020304" pitchFamily="18" charset="0"/>
-                <a:cs typeface="Times New Roman" panose="02020603050405020304" pitchFamily="18" charset="0"/>
-              </a:rPr>
-              <a:t>Disponível em: </a:t>
-            </a:r>
-            <a:r>
-              <a:rPr lang="pt-BR" sz="2400" dirty="0">
-                <a:latin typeface="Times New Roman" panose="02020603050405020304" pitchFamily="18" charset="0"/>
-                <a:cs typeface="Times New Roman" panose="02020603050405020304" pitchFamily="18" charset="0"/>
-                <a:hlinkClick r:id="rId3"/>
-              </a:rPr>
-              <a:t>https://</a:t>
-            </a:r>
-            <a:endParaRPr lang="pt-BR" sz="2400" dirty="0">
-              <a:latin typeface="Times New Roman" panose="02020603050405020304" pitchFamily="18" charset="0"/>
-              <a:cs typeface="Times New Roman" panose="02020603050405020304" pitchFamily="18" charset="0"/>
-            </a:endParaRPr>
-          </a:p>
-          <a:p>
-            <a:pPr marL="0" indent="0" algn="just">
-              <a:buNone/>
-            </a:pPr>
-            <a:endParaRPr lang="pt-BR" sz="2400" dirty="0">
-              <a:latin typeface="Times New Roman" panose="02020603050405020304" pitchFamily="18" charset="0"/>
-              <a:cs typeface="Times New Roman" panose="02020603050405020304" pitchFamily="18" charset="0"/>
-            </a:endParaRPr>
-          </a:p>
-          <a:p>
-            <a:pPr marL="0" indent="0" algn="just">
-              <a:buNone/>
-            </a:pPr>
-            <a:r>
-              <a:rPr lang="pt-BR" sz="2400" dirty="0">
-                <a:latin typeface="Times New Roman" panose="02020603050405020304" pitchFamily="18" charset="0"/>
-                <a:cs typeface="Times New Roman" panose="02020603050405020304" pitchFamily="18" charset="0"/>
-              </a:rPr>
-              <a:t>[2</a:t>
-            </a:r>
-            <a:r>
-              <a:rPr lang="pt-BR" sz="2400">
-                <a:latin typeface="Times New Roman" panose="02020603050405020304" pitchFamily="18" charset="0"/>
-                <a:cs typeface="Times New Roman" panose="02020603050405020304" pitchFamily="18" charset="0"/>
-              </a:rPr>
-              <a:t>] Protocolos de Rede para IOT em Python. </a:t>
-            </a:r>
-            <a:endParaRPr lang="pt-BR" sz="2400" dirty="0">
-              <a:latin typeface="Times New Roman" panose="02020603050405020304" pitchFamily="18" charset="0"/>
-              <a:cs typeface="Times New Roman" panose="02020603050405020304" pitchFamily="18" charset="0"/>
-            </a:endParaRPr>
-          </a:p>
-          <a:p>
-            <a:pPr marL="0" indent="0" algn="just">
-              <a:buNone/>
-            </a:pPr>
-            <a:r>
-              <a:rPr lang="pt-BR" sz="2400" b="1" dirty="0">
-                <a:solidFill>
-                  <a:srgbClr val="FF0000"/>
-                </a:solidFill>
-                <a:latin typeface="Times New Roman" panose="02020603050405020304" pitchFamily="18" charset="0"/>
-                <a:cs typeface="Times New Roman" panose="02020603050405020304" pitchFamily="18" charset="0"/>
-              </a:rPr>
-              <a:t>Disponível em: </a:t>
-            </a:r>
-            <a:r>
-              <a:rPr lang="pt-BR" sz="2400" dirty="0">
-                <a:latin typeface="Times New Roman" panose="02020603050405020304" pitchFamily="18" charset="0"/>
-                <a:cs typeface="Times New Roman" panose="02020603050405020304" pitchFamily="18" charset="0"/>
-                <a:hlinkClick r:id="rId4"/>
-              </a:rPr>
-              <a:t>https://</a:t>
-            </a:r>
-            <a:endParaRPr lang="pt-BR" sz="2400" dirty="0">
-              <a:latin typeface="Times New Roman" panose="02020603050405020304" pitchFamily="18" charset="0"/>
-              <a:cs typeface="Times New Roman" panose="02020603050405020304" pitchFamily="18" charset="0"/>
-            </a:endParaRPr>
-          </a:p>
-          <a:p>
-            <a:pPr marL="0" indent="0" algn="just">
-              <a:buNone/>
-            </a:pPr>
-            <a:endParaRPr lang="pt-BR" sz="2400" dirty="0">
-              <a:latin typeface="Times New Roman" panose="02020603050405020304" pitchFamily="18" charset="0"/>
-              <a:cs typeface="Times New Roman" panose="02020603050405020304" pitchFamily="18" charset="0"/>
-            </a:endParaRPr>
-          </a:p>
-        </p:txBody>
-      </p:sp>
-    </p:spTree>
-    <p:extLst>
-      <p:ext uri="{BB962C8B-B14F-4D97-AF65-F5344CB8AC3E}">
-        <p14:creationId xmlns:p14="http://schemas.microsoft.com/office/powerpoint/2010/main" val="2747596967"/>
-      </p:ext>
-    </p:extLst>
-  </p:cSld>
-  <p:clrMapOvr>
-    <a:masterClrMapping/>
-  </p:clrMapOvr>
-  <p:transition spd="med"/>
-</p:sld>
-</file>
-
-<file path=ppt/slides/slide7.xml><?xml version="1.0" encoding="utf-8"?>
-<p:sld xmlns:a="http://schemas.openxmlformats.org/drawingml/2006/main" xmlns:r="http://schemas.openxmlformats.org/officeDocument/2006/relationships" xmlns:p="http://schemas.openxmlformats.org/presentationml/2006/main">
-  <p:cSld>
-    <p:spTree>
-      <p:nvGrpSpPr>
-        <p:cNvPr id="1" name=""/>
-        <p:cNvGrpSpPr/>
-        <p:nvPr/>
-      </p:nvGrpSpPr>
-      <p:grpSpPr>
-        <a:xfrm>
-          <a:off x="0" y="0"/>
-          <a:ext cx="0" cy="0"/>
-          <a:chOff x="0" y="0"/>
-          <a:chExt cx="0" cy="0"/>
-        </a:xfrm>
-      </p:grpSpPr>
-      <p:sp>
-        <p:nvSpPr>
-          <p:cNvPr id="6" name="Title 1"/>
-          <p:cNvSpPr>
-            <a:spLocks noGrp="1"/>
-          </p:cNvSpPr>
-          <p:nvPr>
-            <p:ph type="title"/>
-          </p:nvPr>
-        </p:nvSpPr>
-        <p:spPr>
-          <a:xfrm>
-            <a:off x="457200" y="205980"/>
-            <a:ext cx="8229600" cy="857251"/>
-          </a:xfrm>
-        </p:spPr>
-        <p:txBody>
-          <a:bodyPr>
-            <a:normAutofit/>
-          </a:bodyPr>
-          <a:lstStyle/>
-          <a:p>
-            <a:r>
-              <a:rPr lang="en-US" b="1" dirty="0" err="1">
-                <a:solidFill>
-                  <a:srgbClr val="0070C0"/>
-                </a:solidFill>
-              </a:rPr>
-              <a:t>Dinâmica</a:t>
-            </a:r>
-            <a:r>
-              <a:rPr lang="en-US" b="1" dirty="0">
-                <a:solidFill>
-                  <a:srgbClr val="0070C0"/>
-                </a:solidFill>
-              </a:rPr>
-              <a:t>/</a:t>
-            </a:r>
-            <a:r>
-              <a:rPr lang="en-US" b="1" dirty="0" err="1">
-                <a:solidFill>
-                  <a:srgbClr val="0070C0"/>
-                </a:solidFill>
-              </a:rPr>
-              <a:t>Atividades</a:t>
-            </a:r>
-            <a:endParaRPr lang="en-US" b="1" dirty="0">
-              <a:solidFill>
-                <a:srgbClr val="0070C0"/>
-              </a:solidFill>
-            </a:endParaRPr>
-          </a:p>
-        </p:txBody>
-      </p:sp>
-      <p:sp>
-        <p:nvSpPr>
-          <p:cNvPr id="8" name="Text Placeholder 2"/>
-          <p:cNvSpPr>
-            <a:spLocks noGrp="1"/>
-          </p:cNvSpPr>
-          <p:nvPr>
-            <p:ph type="body" sz="half" idx="1"/>
-          </p:nvPr>
-        </p:nvSpPr>
-        <p:spPr>
-          <a:xfrm>
-            <a:off x="139472" y="1063230"/>
-            <a:ext cx="8865056" cy="3606305"/>
-          </a:xfrm>
-        </p:spPr>
-        <p:txBody>
-          <a:bodyPr>
-            <a:noAutofit/>
-          </a:bodyPr>
-          <a:lstStyle/>
-          <a:p>
-            <a:pPr marL="0" indent="0" algn="just">
-              <a:buNone/>
-            </a:pPr>
-            <a:r>
-              <a:rPr lang="pt-BR" sz="2400" dirty="0">
-                <a:latin typeface="Times New Roman" panose="02020603050405020304" pitchFamily="18" charset="0"/>
-                <a:cs typeface="Times New Roman" panose="02020603050405020304" pitchFamily="18" charset="0"/>
-              </a:rPr>
-              <a:t>Exercícios (Atividade Verificadora de Aprendizagem)</a:t>
-            </a:r>
-          </a:p>
-          <a:p>
-            <a:pPr marL="0" indent="0" algn="just">
-              <a:buNone/>
-            </a:pPr>
-            <a:r>
-              <a:rPr lang="pt-BR" sz="2400" dirty="0">
-                <a:latin typeface="Times New Roman" panose="02020603050405020304" pitchFamily="18" charset="0"/>
-                <a:cs typeface="Times New Roman" panose="02020603050405020304" pitchFamily="18" charset="0"/>
-              </a:rPr>
-              <a:t> 	</a:t>
-            </a:r>
-          </a:p>
-          <a:p>
-            <a:pPr marL="0" indent="0" algn="just">
-              <a:buNone/>
-            </a:pPr>
-            <a:r>
-              <a:rPr lang="pt-BR" sz="2400" dirty="0">
-                <a:latin typeface="Times New Roman" panose="02020603050405020304" pitchFamily="18" charset="0"/>
-                <a:cs typeface="Times New Roman" panose="02020603050405020304" pitchFamily="18" charset="0"/>
-              </a:rPr>
-              <a:t>-- Plataforma </a:t>
-            </a:r>
-            <a:r>
-              <a:rPr lang="pt-BR" sz="2400" dirty="0" err="1">
-                <a:latin typeface="Times New Roman" panose="02020603050405020304" pitchFamily="18" charset="0"/>
-                <a:cs typeface="Times New Roman" panose="02020603050405020304" pitchFamily="18" charset="0"/>
-              </a:rPr>
-              <a:t>Netlify</a:t>
-            </a:r>
-            <a:r>
-              <a:rPr lang="pt-BR" sz="2400" dirty="0">
-                <a:latin typeface="Times New Roman" panose="02020603050405020304" pitchFamily="18" charset="0"/>
-                <a:cs typeface="Times New Roman" panose="02020603050405020304" pitchFamily="18" charset="0"/>
-              </a:rPr>
-              <a:t> + Integrada com o </a:t>
-            </a:r>
-            <a:r>
-              <a:rPr lang="pt-BR" sz="2400" dirty="0" err="1">
-                <a:latin typeface="Times New Roman" panose="02020603050405020304" pitchFamily="18" charset="0"/>
-                <a:cs typeface="Times New Roman" panose="02020603050405020304" pitchFamily="18" charset="0"/>
-              </a:rPr>
-              <a:t>Github</a:t>
-            </a:r>
-            <a:r>
-              <a:rPr lang="pt-BR" sz="2400" dirty="0">
-                <a:latin typeface="Times New Roman" panose="02020603050405020304" pitchFamily="18" charset="0"/>
-                <a:cs typeface="Times New Roman" panose="02020603050405020304" pitchFamily="18" charset="0"/>
-              </a:rPr>
-              <a:t>/</a:t>
-            </a:r>
-            <a:r>
-              <a:rPr lang="pt-BR" sz="2400" dirty="0" err="1">
-                <a:latin typeface="Times New Roman" panose="02020603050405020304" pitchFamily="18" charset="0"/>
-                <a:cs typeface="Times New Roman" panose="02020603050405020304" pitchFamily="18" charset="0"/>
-              </a:rPr>
-              <a:t>Git</a:t>
-            </a:r>
-            <a:endParaRPr lang="pt-BR" sz="2400" dirty="0">
-              <a:latin typeface="Times New Roman" panose="02020603050405020304" pitchFamily="18" charset="0"/>
-              <a:cs typeface="Times New Roman" panose="02020603050405020304" pitchFamily="18" charset="0"/>
-            </a:endParaRPr>
-          </a:p>
-          <a:p>
-            <a:pPr marL="0" indent="0" algn="just">
-              <a:buNone/>
-            </a:pPr>
-            <a:r>
-              <a:rPr lang="pt-BR" sz="2400" dirty="0">
-                <a:latin typeface="Times New Roman" panose="02020603050405020304" pitchFamily="18" charset="0"/>
-                <a:cs typeface="Times New Roman" panose="02020603050405020304" pitchFamily="18" charset="0"/>
-              </a:rPr>
-              <a:t>https://github.com/</a:t>
-            </a:r>
-          </a:p>
-          <a:p>
-            <a:pPr marL="0" indent="0" algn="just">
-              <a:buNone/>
-            </a:pPr>
-            <a:r>
-              <a:rPr lang="pt-BR" sz="2400" dirty="0">
-                <a:latin typeface="Times New Roman" panose="02020603050405020304" pitchFamily="18" charset="0"/>
-                <a:cs typeface="Times New Roman" panose="02020603050405020304" pitchFamily="18" charset="0"/>
-              </a:rPr>
-              <a:t>https://git-scm.com/downloads</a:t>
-            </a:r>
-          </a:p>
-          <a:p>
-            <a:pPr marL="0" indent="0" algn="just">
-              <a:buNone/>
-            </a:pPr>
-            <a:r>
-              <a:rPr lang="pt-BR" sz="2400" dirty="0">
-                <a:latin typeface="Times New Roman" panose="02020603050405020304" pitchFamily="18" charset="0"/>
-                <a:cs typeface="Times New Roman" panose="02020603050405020304" pitchFamily="18" charset="0"/>
-              </a:rPr>
-              <a:t>https://www.netlify.com/</a:t>
-            </a:r>
-          </a:p>
-          <a:p>
-            <a:pPr marL="0" indent="0" algn="just">
-              <a:buNone/>
-            </a:pPr>
-            <a:endParaRPr lang="pt-BR" sz="2400" dirty="0">
-              <a:latin typeface="Times New Roman" panose="02020603050405020304" pitchFamily="18" charset="0"/>
-              <a:cs typeface="Times New Roman" panose="02020603050405020304" pitchFamily="18" charset="0"/>
-            </a:endParaRPr>
-          </a:p>
-          <a:p>
-            <a:pPr marL="0" indent="0" algn="just">
-              <a:buNone/>
-            </a:pPr>
-            <a:r>
-              <a:rPr lang="pt-BR" sz="2400" dirty="0">
-                <a:latin typeface="Times New Roman" panose="02020603050405020304" pitchFamily="18" charset="0"/>
-                <a:cs typeface="Times New Roman" panose="02020603050405020304" pitchFamily="18" charset="0"/>
-              </a:rPr>
-              <a:t>Criar e </a:t>
-            </a:r>
-            <a:r>
-              <a:rPr lang="pt-BR" sz="2400" dirty="0" err="1">
-                <a:latin typeface="Times New Roman" panose="02020603050405020304" pitchFamily="18" charset="0"/>
-                <a:cs typeface="Times New Roman" panose="02020603050405020304" pitchFamily="18" charset="0"/>
-              </a:rPr>
-              <a:t>deploy</a:t>
-            </a:r>
-            <a:r>
-              <a:rPr lang="pt-BR" sz="2400" dirty="0">
-                <a:latin typeface="Times New Roman" panose="02020603050405020304" pitchFamily="18" charset="0"/>
-                <a:cs typeface="Times New Roman" panose="02020603050405020304" pitchFamily="18" charset="0"/>
-              </a:rPr>
-              <a:t> app teste</a:t>
-            </a:r>
-            <a:endParaRPr lang="pt-BR" sz="2400" dirty="0">
-              <a:latin typeface="Calibri" panose="020F0502020204030204" pitchFamily="34" charset="0"/>
-            </a:endParaRPr>
-          </a:p>
-        </p:txBody>
-      </p:sp>
-    </p:spTree>
-    <p:extLst>
-      <p:ext uri="{BB962C8B-B14F-4D97-AF65-F5344CB8AC3E}">
-        <p14:creationId xmlns:p14="http://schemas.microsoft.com/office/powerpoint/2010/main" val="1397642976"/>
-      </p:ext>
-    </p:extLst>
-  </p:cSld>
-  <p:clrMapOvr>
-    <a:masterClrMapping/>
-  </p:clrMapOvr>
-  <p:transition spd="med"/>
-</p:sld>
-</file>
-
-<file path=ppt/slides/slide8.xml><?xml version="1.0" encoding="utf-8"?>
-<p:sld xmlns:a="http://schemas.openxmlformats.org/drawingml/2006/main" xmlns:r="http://schemas.openxmlformats.org/officeDocument/2006/relationships" xmlns:p="http://schemas.openxmlformats.org/presentationml/2006/main">
-  <p:cSld>
-    <p:spTree>
-      <p:nvGrpSpPr>
-        <p:cNvPr id="1" name=""/>
-        <p:cNvGrpSpPr/>
-        <p:nvPr/>
-      </p:nvGrpSpPr>
-      <p:grpSpPr>
-        <a:xfrm>
-          <a:off x="0" y="0"/>
-          <a:ext cx="0" cy="0"/>
-          <a:chOff x="0" y="0"/>
-          <a:chExt cx="0" cy="0"/>
-        </a:xfrm>
-      </p:grpSpPr>
-      <p:sp>
-        <p:nvSpPr>
-          <p:cNvPr id="6" name="Title 1"/>
-          <p:cNvSpPr>
-            <a:spLocks noGrp="1"/>
-          </p:cNvSpPr>
-          <p:nvPr>
-            <p:ph type="title"/>
-          </p:nvPr>
-        </p:nvSpPr>
-        <p:spPr>
-          <a:xfrm>
-            <a:off x="457200" y="205980"/>
-            <a:ext cx="8229600" cy="857251"/>
-          </a:xfrm>
-        </p:spPr>
-        <p:txBody>
-          <a:bodyPr>
-            <a:normAutofit/>
-          </a:bodyPr>
-          <a:lstStyle/>
-          <a:p>
-            <a:r>
-              <a:rPr lang="en-US" b="1" dirty="0" err="1">
-                <a:solidFill>
-                  <a:srgbClr val="0070C0"/>
-                </a:solidFill>
-              </a:rPr>
-              <a:t>Referências</a:t>
-            </a:r>
-            <a:r>
-              <a:rPr lang="en-US" b="1" dirty="0">
-                <a:solidFill>
-                  <a:srgbClr val="0070C0"/>
-                </a:solidFill>
-              </a:rPr>
-              <a:t> </a:t>
-            </a:r>
-            <a:r>
-              <a:rPr lang="en-US" b="1" dirty="0" err="1">
-                <a:solidFill>
-                  <a:srgbClr val="0070C0"/>
-                </a:solidFill>
-              </a:rPr>
-              <a:t>Bibliográficas</a:t>
-            </a:r>
-            <a:endParaRPr lang="en-US" b="1" dirty="0">
-              <a:solidFill>
-                <a:srgbClr val="0070C0"/>
-              </a:solidFill>
-            </a:endParaRPr>
-          </a:p>
-        </p:txBody>
-      </p:sp>
-      <p:sp>
-        <p:nvSpPr>
-          <p:cNvPr id="8" name="Text Placeholder 2"/>
-          <p:cNvSpPr>
-            <a:spLocks noGrp="1"/>
-          </p:cNvSpPr>
-          <p:nvPr>
-            <p:ph type="body" sz="half" idx="1"/>
-          </p:nvPr>
-        </p:nvSpPr>
-        <p:spPr>
-          <a:xfrm>
-            <a:off x="142865" y="1200151"/>
-            <a:ext cx="8865056" cy="3394472"/>
-          </a:xfrm>
-        </p:spPr>
-        <p:txBody>
-          <a:bodyPr>
-            <a:noAutofit/>
-          </a:bodyPr>
-          <a:lstStyle/>
-          <a:p>
-            <a:pPr marL="0" indent="0" algn="just">
-              <a:buNone/>
-            </a:pPr>
-            <a:r>
-              <a:rPr lang="pt-BR" sz="2000" dirty="0">
-                <a:latin typeface="Times New Roman" panose="02020603050405020304" pitchFamily="18" charset="0"/>
-                <a:cs typeface="Times New Roman" panose="02020603050405020304" pitchFamily="18" charset="0"/>
-              </a:rPr>
-              <a:t>[1] .</a:t>
-            </a:r>
-          </a:p>
-          <a:p>
-            <a:pPr marL="0" indent="0" algn="just">
-              <a:buNone/>
-            </a:pPr>
-            <a:endParaRPr lang="pt-BR" sz="2000" dirty="0">
-              <a:latin typeface="Times New Roman" panose="02020603050405020304" pitchFamily="18" charset="0"/>
-              <a:cs typeface="Times New Roman" panose="02020603050405020304" pitchFamily="18" charset="0"/>
-            </a:endParaRPr>
-          </a:p>
-          <a:p>
-            <a:pPr marL="0" indent="0" algn="just">
-              <a:buNone/>
-            </a:pPr>
-            <a:r>
-              <a:rPr lang="pt-BR" sz="2000" dirty="0">
-                <a:latin typeface="Times New Roman" panose="02020603050405020304" pitchFamily="18" charset="0"/>
-                <a:cs typeface="Times New Roman" panose="02020603050405020304" pitchFamily="18" charset="0"/>
-              </a:rPr>
-              <a:t>[2] </a:t>
-            </a:r>
-            <a:r>
-              <a:rPr lang="pt-BR" sz="2000" dirty="0">
-                <a:latin typeface="Calibri" panose="020F0502020204030204" pitchFamily="34" charset="0"/>
-              </a:rPr>
-              <a:t>.</a:t>
-            </a:r>
-          </a:p>
-          <a:p>
-            <a:pPr marL="0" indent="0" algn="just">
-              <a:buNone/>
-            </a:pPr>
-            <a:endParaRPr lang="pt-BR" sz="2000" dirty="0">
-              <a:latin typeface="Calibri" panose="020F0502020204030204" pitchFamily="34" charset="0"/>
-            </a:endParaRPr>
-          </a:p>
-          <a:p>
-            <a:pPr marL="0" indent="0" algn="just">
-              <a:buNone/>
-            </a:pPr>
-            <a:r>
-              <a:rPr lang="pt-BR" sz="2000" dirty="0">
-                <a:latin typeface="Calibri" panose="020F0502020204030204" pitchFamily="34" charset="0"/>
-              </a:rPr>
-              <a:t>[3] .</a:t>
-            </a:r>
-          </a:p>
-        </p:txBody>
-      </p:sp>
-    </p:spTree>
-    <p:extLst>
-      <p:ext uri="{BB962C8B-B14F-4D97-AF65-F5344CB8AC3E}">
-        <p14:creationId xmlns:p14="http://schemas.microsoft.com/office/powerpoint/2010/main" val="1115311843"/>
-      </p:ext>
-    </p:extLst>
-  </p:cSld>
-  <p:clrMapOvr>
-    <a:masterClrMapping/>
-  </p:clrMapOvr>
-  <p:transition spd="med"/>
-</p:sld>
-</file>
-
-<file path=ppt/slides/slide9.xml><?xml version="1.0" encoding="utf-8"?>
+<file path=ppt/slides/slide2.xml><?xml version="1.0" encoding="utf-8"?>
 <p:sld xmlns:a="http://schemas.openxmlformats.org/drawingml/2006/main" xmlns:r="http://schemas.openxmlformats.org/officeDocument/2006/relationships" xmlns:p="http://schemas.openxmlformats.org/presentationml/2006/main">
   <p:cSld>
     <p:spTree>
@@ -5482,7 +4677,7 @@
           <p:nvPr/>
         </p:nvPicPr>
         <p:blipFill>
-          <a:blip r:embed="rId2"/>
+          <a:blip r:embed="rId3"/>
           <a:stretch>
             <a:fillRect/>
           </a:stretch>
@@ -5511,7 +4706,7 @@
           <p:nvPr/>
         </p:nvPicPr>
         <p:blipFill>
-          <a:blip r:embed="rId3"/>
+          <a:blip r:embed="rId4"/>
           <a:stretch>
             <a:fillRect/>
           </a:stretch>
@@ -5543,8 +4738,8 @@
         </p:nvSpPr>
         <p:spPr>
           <a:xfrm>
-            <a:off x="285751" y="2386770"/>
-            <a:ext cx="8615364" cy="1102519"/>
+            <a:off x="348258" y="2277667"/>
+            <a:ext cx="8681444" cy="1102519"/>
           </a:xfrm>
         </p:spPr>
         <p:txBody>
@@ -5553,13 +4748,44 @@
           </a:bodyPr>
           <a:lstStyle/>
           <a:p>
-            <a:r>
-              <a:rPr lang="pt-BR" sz="4800" b="1" dirty="0">
+            <a:pPr algn="l"/>
+            <a:br>
+              <a:rPr lang="pt-BR" b="1" dirty="0">
                 <a:solidFill>
                   <a:schemeClr val="bg1"/>
                 </a:solidFill>
               </a:rPr>
-              <a:t>Aplicação Cloud Indústria 40 Python</a:t>
+            </a:br>
+            <a:r>
+              <a:rPr lang="pt-BR" b="1" dirty="0">
+                <a:solidFill>
+                  <a:schemeClr val="bg1"/>
+                </a:solidFill>
+              </a:rPr>
+              <a:t>Aula 02</a:t>
+            </a:r>
+            <a:br>
+              <a:rPr lang="pt-BR" b="1" dirty="0">
+                <a:solidFill>
+                  <a:schemeClr val="bg1"/>
+                </a:solidFill>
+              </a:rPr>
+            </a:br>
+            <a:r>
+              <a:rPr lang="pt-BR" b="1" dirty="0">
+                <a:solidFill>
+                  <a:schemeClr val="bg1"/>
+                </a:solidFill>
+              </a:rPr>
+              <a:t>	</a:t>
+            </a:r>
+            <a:r>
+              <a:rPr lang="pt-BR" sz="3600" b="1" dirty="0">
+                <a:solidFill>
+                  <a:schemeClr val="bg1"/>
+                </a:solidFill>
+              </a:rPr>
+              <a:t>Plataformas Middleware,  Comunicação e Protocolos de Rede IOT</a:t>
             </a:r>
           </a:p>
         </p:txBody>
@@ -5851,12 +5077,12 @@
               <a:t>Professor </a:t>
             </a:r>
             <a:r>
-              <a:rPr lang="pt-BR" sz="2000" b="1">
+              <a:rPr lang="pt-BR" sz="2000" b="1" dirty="0" err="1">
                 <a:solidFill>
                   <a:schemeClr val="bg1"/>
                 </a:solidFill>
               </a:rPr>
-              <a:t>M.Sc</a:t>
+              <a:t>MSc</a:t>
             </a:r>
             <a:r>
               <a:rPr lang="pt-BR" sz="2000" b="1" dirty="0">
@@ -5871,10 +5097,10 @@
       </p:sp>
       <p:pic>
         <p:nvPicPr>
-          <p:cNvPr id="2" name="Google Shape;62;p1" descr="Imagem">
+          <p:cNvPr id="4" name="Google Shape;62;p1" descr="Imagem">
             <a:extLst>
               <a:ext uri="{FF2B5EF4-FFF2-40B4-BE49-F238E27FC236}">
-                <a16:creationId xmlns:a16="http://schemas.microsoft.com/office/drawing/2014/main" id="{9C895622-2963-024D-634E-EA58F5381D06}"/>
+                <a16:creationId xmlns:a16="http://schemas.microsoft.com/office/drawing/2014/main" id="{652F850C-6AD9-5CD4-839F-152858F13612}"/>
               </a:ext>
             </a:extLst>
           </p:cNvPr>
@@ -5882,7 +5108,7 @@
           <p:nvPr/>
         </p:nvPicPr>
         <p:blipFill rotWithShape="1">
-          <a:blip r:embed="rId4">
+          <a:blip r:embed="rId5">
             <a:alphaModFix/>
           </a:blip>
           <a:srcRect/>
@@ -5903,6 +5129,1299 @@
         </p:spPr>
       </p:pic>
     </p:spTree>
+  </p:cSld>
+  <p:clrMapOvr>
+    <a:masterClrMapping/>
+  </p:clrMapOvr>
+  <p:transition spd="med"/>
+</p:sld>
+</file>
+
+<file path=ppt/slides/slide3.xml><?xml version="1.0" encoding="utf-8"?>
+<p:sld xmlns:a="http://schemas.openxmlformats.org/drawingml/2006/main" xmlns:r="http://schemas.openxmlformats.org/officeDocument/2006/relationships" xmlns:p="http://schemas.openxmlformats.org/presentationml/2006/main">
+  <p:cSld>
+    <p:spTree>
+      <p:nvGrpSpPr>
+        <p:cNvPr id="1" name=""/>
+        <p:cNvGrpSpPr/>
+        <p:nvPr/>
+      </p:nvGrpSpPr>
+      <p:grpSpPr>
+        <a:xfrm>
+          <a:off x="0" y="0"/>
+          <a:ext cx="0" cy="0"/>
+          <a:chOff x="0" y="0"/>
+          <a:chExt cx="0" cy="0"/>
+        </a:xfrm>
+      </p:grpSpPr>
+      <p:sp>
+        <p:nvSpPr>
+          <p:cNvPr id="6" name="Title 1"/>
+          <p:cNvSpPr>
+            <a:spLocks noGrp="1"/>
+          </p:cNvSpPr>
+          <p:nvPr>
+            <p:ph type="title"/>
+          </p:nvPr>
+        </p:nvSpPr>
+        <p:spPr>
+          <a:xfrm>
+            <a:off x="457200" y="205980"/>
+            <a:ext cx="8229600" cy="857251"/>
+          </a:xfrm>
+        </p:spPr>
+        <p:txBody>
+          <a:bodyPr>
+            <a:normAutofit/>
+          </a:bodyPr>
+          <a:lstStyle/>
+          <a:p>
+            <a:r>
+              <a:rPr lang="pt-BR" b="1" dirty="0">
+                <a:solidFill>
+                  <a:srgbClr val="0070C0"/>
+                </a:solidFill>
+              </a:rPr>
+              <a:t>Plataformas Middleware</a:t>
+            </a:r>
+            <a:endParaRPr lang="en-US" b="1" dirty="0">
+              <a:solidFill>
+                <a:srgbClr val="0070C0"/>
+              </a:solidFill>
+            </a:endParaRPr>
+          </a:p>
+        </p:txBody>
+      </p:sp>
+      <p:sp>
+        <p:nvSpPr>
+          <p:cNvPr id="8" name="Text Placeholder 2"/>
+          <p:cNvSpPr>
+            <a:spLocks noGrp="1"/>
+          </p:cNvSpPr>
+          <p:nvPr>
+            <p:ph type="body" sz="half" idx="1"/>
+          </p:nvPr>
+        </p:nvSpPr>
+        <p:spPr>
+          <a:xfrm>
+            <a:off x="142865" y="1200150"/>
+            <a:ext cx="8865056" cy="3737370"/>
+          </a:xfrm>
+        </p:spPr>
+        <p:txBody>
+          <a:bodyPr>
+            <a:noAutofit/>
+          </a:bodyPr>
+          <a:lstStyle/>
+          <a:p>
+            <a:pPr marL="0" indent="0" algn="just">
+              <a:buNone/>
+            </a:pPr>
+            <a:r>
+              <a:rPr lang="pt-BR" sz="2000" dirty="0">
+                <a:latin typeface="Times New Roman" panose="02020603050405020304" pitchFamily="18" charset="0"/>
+                <a:cs typeface="Times New Roman" panose="02020603050405020304" pitchFamily="18" charset="0"/>
+              </a:rPr>
+              <a:t>Middleware</a:t>
+            </a:r>
+          </a:p>
+          <a:p>
+            <a:pPr marL="0" indent="0" algn="just">
+              <a:buNone/>
+            </a:pPr>
+            <a:endParaRPr lang="pt-BR" sz="2000" dirty="0">
+              <a:solidFill>
+                <a:schemeClr val="tx1"/>
+              </a:solidFill>
+              <a:latin typeface="Times New Roman" panose="02020603050405020304" pitchFamily="18" charset="0"/>
+              <a:cs typeface="Times New Roman" panose="02020603050405020304" pitchFamily="18" charset="0"/>
+            </a:endParaRPr>
+          </a:p>
+        </p:txBody>
+      </p:sp>
+    </p:spTree>
+    <p:extLst>
+      <p:ext uri="{BB962C8B-B14F-4D97-AF65-F5344CB8AC3E}">
+        <p14:creationId xmlns:p14="http://schemas.microsoft.com/office/powerpoint/2010/main" val="1263249216"/>
+      </p:ext>
+    </p:extLst>
+  </p:cSld>
+  <p:clrMapOvr>
+    <a:masterClrMapping/>
+  </p:clrMapOvr>
+  <p:transition spd="med"/>
+</p:sld>
+</file>
+
+<file path=ppt/slides/slide4.xml><?xml version="1.0" encoding="utf-8"?>
+<p:sld xmlns:a="http://schemas.openxmlformats.org/drawingml/2006/main" xmlns:r="http://schemas.openxmlformats.org/officeDocument/2006/relationships" xmlns:p="http://schemas.openxmlformats.org/presentationml/2006/main">
+  <p:cSld>
+    <p:spTree>
+      <p:nvGrpSpPr>
+        <p:cNvPr id="1" name=""/>
+        <p:cNvGrpSpPr/>
+        <p:nvPr/>
+      </p:nvGrpSpPr>
+      <p:grpSpPr>
+        <a:xfrm>
+          <a:off x="0" y="0"/>
+          <a:ext cx="0" cy="0"/>
+          <a:chOff x="0" y="0"/>
+          <a:chExt cx="0" cy="0"/>
+        </a:xfrm>
+      </p:grpSpPr>
+      <p:sp>
+        <p:nvSpPr>
+          <p:cNvPr id="6" name="Title 1"/>
+          <p:cNvSpPr>
+            <a:spLocks noGrp="1"/>
+          </p:cNvSpPr>
+          <p:nvPr>
+            <p:ph type="title"/>
+          </p:nvPr>
+        </p:nvSpPr>
+        <p:spPr>
+          <a:xfrm>
+            <a:off x="457200" y="205980"/>
+            <a:ext cx="8229600" cy="857251"/>
+          </a:xfrm>
+        </p:spPr>
+        <p:txBody>
+          <a:bodyPr>
+            <a:normAutofit/>
+          </a:bodyPr>
+          <a:lstStyle/>
+          <a:p>
+            <a:r>
+              <a:rPr lang="pt-BR" b="1" dirty="0">
+                <a:solidFill>
+                  <a:srgbClr val="0070C0"/>
+                </a:solidFill>
+              </a:rPr>
+              <a:t>Plataformas de Comunicação </a:t>
+            </a:r>
+            <a:r>
+              <a:rPr lang="pt-BR" b="1" dirty="0" err="1">
+                <a:solidFill>
+                  <a:srgbClr val="0070C0"/>
+                </a:solidFill>
+              </a:rPr>
+              <a:t>IoT</a:t>
+            </a:r>
+            <a:endParaRPr lang="en-US" b="1" dirty="0">
+              <a:solidFill>
+                <a:srgbClr val="0070C0"/>
+              </a:solidFill>
+            </a:endParaRPr>
+          </a:p>
+        </p:txBody>
+      </p:sp>
+      <p:sp>
+        <p:nvSpPr>
+          <p:cNvPr id="8" name="Text Placeholder 2"/>
+          <p:cNvSpPr>
+            <a:spLocks noGrp="1"/>
+          </p:cNvSpPr>
+          <p:nvPr>
+            <p:ph type="body" sz="half" idx="1"/>
+          </p:nvPr>
+        </p:nvSpPr>
+        <p:spPr>
+          <a:xfrm>
+            <a:off x="142865" y="1200150"/>
+            <a:ext cx="8865056" cy="3737370"/>
+          </a:xfrm>
+        </p:spPr>
+        <p:txBody>
+          <a:bodyPr>
+            <a:noAutofit/>
+          </a:bodyPr>
+          <a:lstStyle/>
+          <a:p>
+            <a:pPr marL="0" indent="0" algn="just">
+              <a:buNone/>
+            </a:pPr>
+            <a:r>
+              <a:rPr lang="pt-BR" sz="2000" dirty="0">
+                <a:latin typeface="Times New Roman" panose="02020603050405020304" pitchFamily="18" charset="0"/>
+                <a:cs typeface="Times New Roman" panose="02020603050405020304" pitchFamily="18" charset="0"/>
+              </a:rPr>
+              <a:t>Comunicação</a:t>
+            </a:r>
+            <a:endParaRPr lang="pt-BR" sz="2000" dirty="0">
+              <a:solidFill>
+                <a:schemeClr val="tx1"/>
+              </a:solidFill>
+              <a:latin typeface="Times New Roman" panose="02020603050405020304" pitchFamily="18" charset="0"/>
+              <a:cs typeface="Times New Roman" panose="02020603050405020304" pitchFamily="18" charset="0"/>
+            </a:endParaRPr>
+          </a:p>
+        </p:txBody>
+      </p:sp>
+    </p:spTree>
+    <p:extLst>
+      <p:ext uri="{BB962C8B-B14F-4D97-AF65-F5344CB8AC3E}">
+        <p14:creationId xmlns:p14="http://schemas.microsoft.com/office/powerpoint/2010/main" val="1362980025"/>
+      </p:ext>
+    </p:extLst>
+  </p:cSld>
+  <p:clrMapOvr>
+    <a:masterClrMapping/>
+  </p:clrMapOvr>
+  <p:transition spd="med"/>
+</p:sld>
+</file>
+
+<file path=ppt/slides/slide5.xml><?xml version="1.0" encoding="utf-8"?>
+<p:sld xmlns:a="http://schemas.openxmlformats.org/drawingml/2006/main" xmlns:r="http://schemas.openxmlformats.org/officeDocument/2006/relationships" xmlns:p="http://schemas.openxmlformats.org/presentationml/2006/main">
+  <p:cSld>
+    <p:spTree>
+      <p:nvGrpSpPr>
+        <p:cNvPr id="1" name=""/>
+        <p:cNvGrpSpPr/>
+        <p:nvPr/>
+      </p:nvGrpSpPr>
+      <p:grpSpPr>
+        <a:xfrm>
+          <a:off x="0" y="0"/>
+          <a:ext cx="0" cy="0"/>
+          <a:chOff x="0" y="0"/>
+          <a:chExt cx="0" cy="0"/>
+        </a:xfrm>
+      </p:grpSpPr>
+      <p:sp>
+        <p:nvSpPr>
+          <p:cNvPr id="6" name="Title 1"/>
+          <p:cNvSpPr>
+            <a:spLocks noGrp="1"/>
+          </p:cNvSpPr>
+          <p:nvPr>
+            <p:ph type="title"/>
+          </p:nvPr>
+        </p:nvSpPr>
+        <p:spPr>
+          <a:xfrm>
+            <a:off x="457200" y="205980"/>
+            <a:ext cx="8229600" cy="857251"/>
+          </a:xfrm>
+        </p:spPr>
+        <p:txBody>
+          <a:bodyPr>
+            <a:normAutofit/>
+          </a:bodyPr>
+          <a:lstStyle/>
+          <a:p>
+            <a:r>
+              <a:rPr lang="pt-BR" b="1" dirty="0">
+                <a:solidFill>
+                  <a:srgbClr val="0070C0"/>
+                </a:solidFill>
+              </a:rPr>
+              <a:t>Plataformas Middleware</a:t>
+            </a:r>
+            <a:endParaRPr lang="en-US" b="1" dirty="0">
+              <a:solidFill>
+                <a:srgbClr val="0070C0"/>
+              </a:solidFill>
+            </a:endParaRPr>
+          </a:p>
+        </p:txBody>
+      </p:sp>
+      <p:sp>
+        <p:nvSpPr>
+          <p:cNvPr id="8" name="Text Placeholder 2"/>
+          <p:cNvSpPr>
+            <a:spLocks noGrp="1"/>
+          </p:cNvSpPr>
+          <p:nvPr>
+            <p:ph type="body" sz="half" idx="1"/>
+          </p:nvPr>
+        </p:nvSpPr>
+        <p:spPr>
+          <a:xfrm>
+            <a:off x="142865" y="1200150"/>
+            <a:ext cx="8865056" cy="3737370"/>
+          </a:xfrm>
+        </p:spPr>
+        <p:txBody>
+          <a:bodyPr>
+            <a:noAutofit/>
+          </a:bodyPr>
+          <a:lstStyle/>
+          <a:p>
+            <a:pPr algn="just">
+              <a:buFont typeface="Wingdings" panose="05000000000000000000" pitchFamily="2" charset="2"/>
+              <a:buChar char="§"/>
+            </a:pPr>
+            <a:r>
+              <a:rPr lang="pt-BR" sz="2000" dirty="0">
+                <a:solidFill>
+                  <a:schemeClr val="tx1"/>
+                </a:solidFill>
+                <a:latin typeface="Times New Roman" panose="02020603050405020304" pitchFamily="18" charset="0"/>
+                <a:cs typeface="Times New Roman" panose="02020603050405020304" pitchFamily="18" charset="0"/>
+              </a:rPr>
+              <a:t>XIVELY</a:t>
+            </a:r>
+          </a:p>
+          <a:p>
+            <a:pPr algn="just">
+              <a:buFont typeface="Wingdings" panose="05000000000000000000" pitchFamily="2" charset="2"/>
+              <a:buChar char="§"/>
+            </a:pPr>
+            <a:r>
+              <a:rPr lang="pt-BR" sz="2000" dirty="0">
+                <a:solidFill>
+                  <a:schemeClr val="tx1"/>
+                </a:solidFill>
+                <a:latin typeface="Times New Roman" panose="02020603050405020304" pitchFamily="18" charset="0"/>
+                <a:cs typeface="Times New Roman" panose="02020603050405020304" pitchFamily="18" charset="0"/>
+              </a:rPr>
+              <a:t>WSO2</a:t>
+            </a:r>
+          </a:p>
+          <a:p>
+            <a:pPr algn="just">
+              <a:buFont typeface="Wingdings" panose="05000000000000000000" pitchFamily="2" charset="2"/>
+              <a:buChar char="§"/>
+            </a:pPr>
+            <a:r>
+              <a:rPr lang="pt-BR" sz="2000" dirty="0">
+                <a:solidFill>
+                  <a:schemeClr val="tx1"/>
+                </a:solidFill>
+                <a:latin typeface="Times New Roman" panose="02020603050405020304" pitchFamily="18" charset="0"/>
+                <a:cs typeface="Times New Roman" panose="02020603050405020304" pitchFamily="18" charset="0"/>
+              </a:rPr>
+              <a:t>THINGSPEAK</a:t>
+            </a:r>
+          </a:p>
+          <a:p>
+            <a:pPr algn="just">
+              <a:buFont typeface="Wingdings" panose="05000000000000000000" pitchFamily="2" charset="2"/>
+              <a:buChar char="§"/>
+            </a:pPr>
+            <a:r>
+              <a:rPr lang="pt-BR" sz="2000" dirty="0">
+                <a:solidFill>
+                  <a:schemeClr val="tx1"/>
+                </a:solidFill>
+                <a:latin typeface="Times New Roman" panose="02020603050405020304" pitchFamily="18" charset="0"/>
+                <a:cs typeface="Times New Roman" panose="02020603050405020304" pitchFamily="18" charset="0"/>
+              </a:rPr>
+              <a:t>OPENIOT</a:t>
+            </a:r>
+          </a:p>
+          <a:p>
+            <a:pPr algn="just">
+              <a:buFont typeface="Wingdings" panose="05000000000000000000" pitchFamily="2" charset="2"/>
+              <a:buChar char="§"/>
+            </a:pPr>
+            <a:r>
+              <a:rPr lang="pt-BR" sz="2000" dirty="0">
+                <a:solidFill>
+                  <a:schemeClr val="tx1"/>
+                </a:solidFill>
+                <a:latin typeface="Times New Roman" panose="02020603050405020304" pitchFamily="18" charset="0"/>
+                <a:cs typeface="Times New Roman" panose="02020603050405020304" pitchFamily="18" charset="0"/>
+              </a:rPr>
+              <a:t>THINGSBOARD</a:t>
+            </a:r>
+          </a:p>
+          <a:p>
+            <a:pPr marL="0" indent="0" algn="just">
+              <a:buNone/>
+            </a:pPr>
+            <a:endParaRPr lang="pt-BR" sz="2000" dirty="0">
+              <a:solidFill>
+                <a:schemeClr val="tx1"/>
+              </a:solidFill>
+              <a:latin typeface="Times New Roman" panose="02020603050405020304" pitchFamily="18" charset="0"/>
+              <a:cs typeface="Times New Roman" panose="02020603050405020304" pitchFamily="18" charset="0"/>
+            </a:endParaRPr>
+          </a:p>
+        </p:txBody>
+      </p:sp>
+    </p:spTree>
+    <p:extLst>
+      <p:ext uri="{BB962C8B-B14F-4D97-AF65-F5344CB8AC3E}">
+        <p14:creationId xmlns:p14="http://schemas.microsoft.com/office/powerpoint/2010/main" val="2053137068"/>
+      </p:ext>
+    </p:extLst>
+  </p:cSld>
+  <p:clrMapOvr>
+    <a:masterClrMapping/>
+  </p:clrMapOvr>
+  <p:transition spd="med"/>
+</p:sld>
+</file>
+
+<file path=ppt/slides/slide6.xml><?xml version="1.0" encoding="utf-8"?>
+<p:sld xmlns:a="http://schemas.openxmlformats.org/drawingml/2006/main" xmlns:r="http://schemas.openxmlformats.org/officeDocument/2006/relationships" xmlns:p="http://schemas.openxmlformats.org/presentationml/2006/main">
+  <p:cSld>
+    <p:spTree>
+      <p:nvGrpSpPr>
+        <p:cNvPr id="1" name=""/>
+        <p:cNvGrpSpPr/>
+        <p:nvPr/>
+      </p:nvGrpSpPr>
+      <p:grpSpPr>
+        <a:xfrm>
+          <a:off x="0" y="0"/>
+          <a:ext cx="0" cy="0"/>
+          <a:chOff x="0" y="0"/>
+          <a:chExt cx="0" cy="0"/>
+        </a:xfrm>
+      </p:grpSpPr>
+      <p:sp>
+        <p:nvSpPr>
+          <p:cNvPr id="6" name="Title 1"/>
+          <p:cNvSpPr>
+            <a:spLocks noGrp="1"/>
+          </p:cNvSpPr>
+          <p:nvPr>
+            <p:ph type="title"/>
+          </p:nvPr>
+        </p:nvSpPr>
+        <p:spPr>
+          <a:xfrm>
+            <a:off x="457200" y="205980"/>
+            <a:ext cx="8229600" cy="857251"/>
+          </a:xfrm>
+        </p:spPr>
+        <p:txBody>
+          <a:bodyPr>
+            <a:normAutofit/>
+          </a:bodyPr>
+          <a:lstStyle/>
+          <a:p>
+            <a:r>
+              <a:rPr lang="pt-BR" b="1" dirty="0">
+                <a:solidFill>
+                  <a:srgbClr val="0070C0"/>
+                </a:solidFill>
+              </a:rPr>
+              <a:t>Protocolos de Rede para IOT</a:t>
+            </a:r>
+            <a:endParaRPr lang="en-US" b="1" dirty="0">
+              <a:solidFill>
+                <a:srgbClr val="0070C0"/>
+              </a:solidFill>
+            </a:endParaRPr>
+          </a:p>
+        </p:txBody>
+      </p:sp>
+      <p:sp>
+        <p:nvSpPr>
+          <p:cNvPr id="8" name="Text Placeholder 2"/>
+          <p:cNvSpPr>
+            <a:spLocks noGrp="1"/>
+          </p:cNvSpPr>
+          <p:nvPr>
+            <p:ph type="body" sz="half" idx="1"/>
+          </p:nvPr>
+        </p:nvSpPr>
+        <p:spPr>
+          <a:xfrm>
+            <a:off x="142865" y="1200150"/>
+            <a:ext cx="8865056" cy="3737370"/>
+          </a:xfrm>
+        </p:spPr>
+        <p:txBody>
+          <a:bodyPr>
+            <a:noAutofit/>
+          </a:bodyPr>
+          <a:lstStyle/>
+          <a:p>
+            <a:pPr algn="just">
+              <a:buFont typeface="Wingdings" panose="05000000000000000000" pitchFamily="2" charset="2"/>
+              <a:buChar char="§"/>
+            </a:pPr>
+            <a:r>
+              <a:rPr lang="pt-BR" sz="2000" dirty="0">
+                <a:latin typeface="Times New Roman" panose="02020603050405020304" pitchFamily="18" charset="0"/>
+                <a:cs typeface="Times New Roman" panose="02020603050405020304" pitchFamily="18" charset="0"/>
+              </a:rPr>
+              <a:t>MQTT</a:t>
+            </a:r>
+          </a:p>
+          <a:p>
+            <a:pPr algn="just">
+              <a:buFont typeface="Wingdings" panose="05000000000000000000" pitchFamily="2" charset="2"/>
+              <a:buChar char="§"/>
+            </a:pPr>
+            <a:r>
+              <a:rPr lang="pt-BR" sz="2000" dirty="0">
+                <a:latin typeface="Times New Roman" panose="02020603050405020304" pitchFamily="18" charset="0"/>
+                <a:cs typeface="Times New Roman" panose="02020603050405020304" pitchFamily="18" charset="0"/>
+              </a:rPr>
+              <a:t>COAP</a:t>
+            </a:r>
+          </a:p>
+          <a:p>
+            <a:pPr algn="just">
+              <a:buFont typeface="Wingdings" panose="05000000000000000000" pitchFamily="2" charset="2"/>
+              <a:buChar char="§"/>
+            </a:pPr>
+            <a:r>
+              <a:rPr lang="pt-BR" sz="2000" dirty="0">
+                <a:latin typeface="Times New Roman" panose="02020603050405020304" pitchFamily="18" charset="0"/>
+                <a:cs typeface="Times New Roman" panose="02020603050405020304" pitchFamily="18" charset="0"/>
+              </a:rPr>
+              <a:t>XMPP­IOT</a:t>
+            </a:r>
+          </a:p>
+          <a:p>
+            <a:pPr algn="just">
+              <a:buFont typeface="Wingdings" panose="05000000000000000000" pitchFamily="2" charset="2"/>
+              <a:buChar char="§"/>
+            </a:pPr>
+            <a:r>
+              <a:rPr lang="pt-BR" sz="2000" dirty="0">
+                <a:latin typeface="Times New Roman" panose="02020603050405020304" pitchFamily="18" charset="0"/>
+                <a:cs typeface="Times New Roman" panose="02020603050405020304" pitchFamily="18" charset="0"/>
+              </a:rPr>
+              <a:t>RESTFUL HTTP </a:t>
+            </a:r>
+          </a:p>
+          <a:p>
+            <a:pPr algn="just">
+              <a:buFont typeface="Wingdings" panose="05000000000000000000" pitchFamily="2" charset="2"/>
+              <a:buChar char="§"/>
+            </a:pPr>
+            <a:r>
+              <a:rPr lang="pt-BR" sz="2000" dirty="0">
+                <a:latin typeface="Times New Roman" panose="02020603050405020304" pitchFamily="18" charset="0"/>
+                <a:cs typeface="Times New Roman" panose="02020603050405020304" pitchFamily="18" charset="0"/>
+              </a:rPr>
+              <a:t>DDS</a:t>
+            </a:r>
+          </a:p>
+          <a:p>
+            <a:pPr algn="just">
+              <a:buFont typeface="Wingdings" panose="05000000000000000000" pitchFamily="2" charset="2"/>
+              <a:buChar char="§"/>
+            </a:pPr>
+            <a:r>
+              <a:rPr lang="pt-BR" sz="2000" dirty="0">
+                <a:latin typeface="Times New Roman" panose="02020603050405020304" pitchFamily="18" charset="0"/>
+                <a:cs typeface="Times New Roman" panose="02020603050405020304" pitchFamily="18" charset="0"/>
+              </a:rPr>
+              <a:t>AMQP</a:t>
+            </a:r>
+          </a:p>
+          <a:p>
+            <a:pPr marL="0" indent="0" algn="just">
+              <a:buNone/>
+            </a:pPr>
+            <a:endParaRPr lang="pt-BR" sz="2000" dirty="0">
+              <a:solidFill>
+                <a:schemeClr val="tx1"/>
+              </a:solidFill>
+              <a:latin typeface="Times New Roman" panose="02020603050405020304" pitchFamily="18" charset="0"/>
+              <a:cs typeface="Times New Roman" panose="02020603050405020304" pitchFamily="18" charset="0"/>
+            </a:endParaRPr>
+          </a:p>
+        </p:txBody>
+      </p:sp>
+    </p:spTree>
+    <p:extLst>
+      <p:ext uri="{BB962C8B-B14F-4D97-AF65-F5344CB8AC3E}">
+        <p14:creationId xmlns:p14="http://schemas.microsoft.com/office/powerpoint/2010/main" val="1754424786"/>
+      </p:ext>
+    </p:extLst>
+  </p:cSld>
+  <p:clrMapOvr>
+    <a:masterClrMapping/>
+  </p:clrMapOvr>
+  <p:transition spd="med"/>
+</p:sld>
+</file>
+
+<file path=ppt/slides/slide7.xml><?xml version="1.0" encoding="utf-8"?>
+<p:sld xmlns:a="http://schemas.openxmlformats.org/drawingml/2006/main" xmlns:r="http://schemas.openxmlformats.org/officeDocument/2006/relationships" xmlns:p="http://schemas.openxmlformats.org/presentationml/2006/main">
+  <p:cSld>
+    <p:spTree>
+      <p:nvGrpSpPr>
+        <p:cNvPr id="1" name=""/>
+        <p:cNvGrpSpPr/>
+        <p:nvPr/>
+      </p:nvGrpSpPr>
+      <p:grpSpPr>
+        <a:xfrm>
+          <a:off x="0" y="0"/>
+          <a:ext cx="0" cy="0"/>
+          <a:chOff x="0" y="0"/>
+          <a:chExt cx="0" cy="0"/>
+        </a:xfrm>
+      </p:grpSpPr>
+      <p:sp>
+        <p:nvSpPr>
+          <p:cNvPr id="6" name="Title 1"/>
+          <p:cNvSpPr>
+            <a:spLocks noGrp="1"/>
+          </p:cNvSpPr>
+          <p:nvPr>
+            <p:ph type="title"/>
+          </p:nvPr>
+        </p:nvSpPr>
+        <p:spPr>
+          <a:xfrm>
+            <a:off x="457200" y="205980"/>
+            <a:ext cx="8229600" cy="857251"/>
+          </a:xfrm>
+        </p:spPr>
+        <p:txBody>
+          <a:bodyPr>
+            <a:normAutofit/>
+          </a:bodyPr>
+          <a:lstStyle/>
+          <a:p>
+            <a:r>
+              <a:rPr lang="en-US" b="1" dirty="0" err="1">
+                <a:solidFill>
+                  <a:srgbClr val="0070C0"/>
+                </a:solidFill>
+              </a:rPr>
+              <a:t>Leitura</a:t>
+            </a:r>
+            <a:r>
+              <a:rPr lang="en-US" b="1" dirty="0">
+                <a:solidFill>
+                  <a:srgbClr val="0070C0"/>
+                </a:solidFill>
+              </a:rPr>
+              <a:t> </a:t>
+            </a:r>
+            <a:r>
+              <a:rPr lang="en-US" b="1" dirty="0" err="1">
+                <a:solidFill>
+                  <a:srgbClr val="0070C0"/>
+                </a:solidFill>
+              </a:rPr>
+              <a:t>Específica</a:t>
+            </a:r>
+            <a:endParaRPr lang="en-US" b="1" dirty="0">
+              <a:solidFill>
+                <a:srgbClr val="0070C0"/>
+              </a:solidFill>
+            </a:endParaRPr>
+          </a:p>
+        </p:txBody>
+      </p:sp>
+      <p:sp>
+        <p:nvSpPr>
+          <p:cNvPr id="8" name="Text Placeholder 2"/>
+          <p:cNvSpPr>
+            <a:spLocks noGrp="1"/>
+          </p:cNvSpPr>
+          <p:nvPr>
+            <p:ph type="body" sz="half" idx="1"/>
+          </p:nvPr>
+        </p:nvSpPr>
+        <p:spPr>
+          <a:xfrm>
+            <a:off x="142865" y="1200151"/>
+            <a:ext cx="8865056" cy="3394472"/>
+          </a:xfrm>
+        </p:spPr>
+        <p:txBody>
+          <a:bodyPr>
+            <a:noAutofit/>
+          </a:bodyPr>
+          <a:lstStyle/>
+          <a:p>
+            <a:pPr marL="0" indent="0" algn="just">
+              <a:buNone/>
+            </a:pPr>
+            <a:r>
+              <a:rPr lang="pt-BR" sz="2400" dirty="0">
+                <a:latin typeface="Times New Roman" panose="02020603050405020304" pitchFamily="18" charset="0"/>
+                <a:cs typeface="Times New Roman" panose="02020603050405020304" pitchFamily="18" charset="0"/>
+              </a:rPr>
+              <a:t>[1] Plataformas de Middleware e de Comunicação para IOT em Python.</a:t>
+            </a:r>
+          </a:p>
+          <a:p>
+            <a:pPr marL="0" indent="0" algn="just">
+              <a:buNone/>
+            </a:pPr>
+            <a:r>
+              <a:rPr lang="pt-BR" sz="2400" b="1" dirty="0">
+                <a:solidFill>
+                  <a:srgbClr val="FF0000"/>
+                </a:solidFill>
+                <a:latin typeface="Times New Roman" panose="02020603050405020304" pitchFamily="18" charset="0"/>
+                <a:cs typeface="Times New Roman" panose="02020603050405020304" pitchFamily="18" charset="0"/>
+              </a:rPr>
+              <a:t>Disponível em: </a:t>
+            </a:r>
+            <a:r>
+              <a:rPr lang="pt-BR" sz="2400" dirty="0">
+                <a:latin typeface="Times New Roman" panose="02020603050405020304" pitchFamily="18" charset="0"/>
+                <a:cs typeface="Times New Roman" panose="02020603050405020304" pitchFamily="18" charset="0"/>
+                <a:hlinkClick r:id="rId3"/>
+              </a:rPr>
+              <a:t>https://</a:t>
+            </a:r>
+            <a:endParaRPr lang="pt-BR" sz="2400" dirty="0">
+              <a:latin typeface="Times New Roman" panose="02020603050405020304" pitchFamily="18" charset="0"/>
+              <a:cs typeface="Times New Roman" panose="02020603050405020304" pitchFamily="18" charset="0"/>
+            </a:endParaRPr>
+          </a:p>
+          <a:p>
+            <a:pPr marL="0" indent="0" algn="just">
+              <a:buNone/>
+            </a:pPr>
+            <a:endParaRPr lang="pt-BR" sz="2400" dirty="0">
+              <a:latin typeface="Times New Roman" panose="02020603050405020304" pitchFamily="18" charset="0"/>
+              <a:cs typeface="Times New Roman" panose="02020603050405020304" pitchFamily="18" charset="0"/>
+            </a:endParaRPr>
+          </a:p>
+          <a:p>
+            <a:pPr marL="0" indent="0" algn="just">
+              <a:buNone/>
+            </a:pPr>
+            <a:r>
+              <a:rPr lang="pt-BR" sz="2400" dirty="0">
+                <a:latin typeface="Times New Roman" panose="02020603050405020304" pitchFamily="18" charset="0"/>
+                <a:cs typeface="Times New Roman" panose="02020603050405020304" pitchFamily="18" charset="0"/>
+              </a:rPr>
+              <a:t>[2] Protocolos de Rede para IOT em Python. </a:t>
+            </a:r>
+          </a:p>
+          <a:p>
+            <a:pPr marL="0" indent="0" algn="just">
+              <a:buNone/>
+            </a:pPr>
+            <a:r>
+              <a:rPr lang="pt-BR" sz="2400" b="1" dirty="0">
+                <a:solidFill>
+                  <a:srgbClr val="FF0000"/>
+                </a:solidFill>
+                <a:latin typeface="Times New Roman" panose="02020603050405020304" pitchFamily="18" charset="0"/>
+                <a:cs typeface="Times New Roman" panose="02020603050405020304" pitchFamily="18" charset="0"/>
+              </a:rPr>
+              <a:t>Disponível em: </a:t>
+            </a:r>
+            <a:r>
+              <a:rPr lang="pt-BR" sz="2400" dirty="0">
+                <a:latin typeface="Times New Roman" panose="02020603050405020304" pitchFamily="18" charset="0"/>
+                <a:cs typeface="Times New Roman" panose="02020603050405020304" pitchFamily="18" charset="0"/>
+                <a:hlinkClick r:id="rId4"/>
+              </a:rPr>
+              <a:t>https:</a:t>
+            </a:r>
+            <a:r>
+              <a:rPr lang="pt-BR" sz="2400" dirty="0">
+                <a:latin typeface="Times New Roman" panose="02020603050405020304" pitchFamily="18" charset="0"/>
+                <a:cs typeface="Times New Roman" panose="02020603050405020304" pitchFamily="18" charset="0"/>
+              </a:rPr>
+              <a:t>//</a:t>
+            </a:r>
+          </a:p>
+          <a:p>
+            <a:pPr marL="0" indent="0" algn="just">
+              <a:buNone/>
+            </a:pPr>
+            <a:endParaRPr lang="pt-BR" sz="2400" dirty="0">
+              <a:latin typeface="Times New Roman" panose="02020603050405020304" pitchFamily="18" charset="0"/>
+              <a:cs typeface="Times New Roman" panose="02020603050405020304" pitchFamily="18" charset="0"/>
+            </a:endParaRPr>
+          </a:p>
+          <a:p>
+            <a:pPr marL="0" indent="0" algn="just">
+              <a:buNone/>
+            </a:pPr>
+            <a:endParaRPr lang="pt-BR" sz="2400" dirty="0">
+              <a:latin typeface="Times New Roman" panose="02020603050405020304" pitchFamily="18" charset="0"/>
+              <a:cs typeface="Times New Roman" panose="02020603050405020304" pitchFamily="18" charset="0"/>
+            </a:endParaRPr>
+          </a:p>
+          <a:p>
+            <a:pPr marL="0" indent="0" algn="just">
+              <a:buNone/>
+            </a:pPr>
+            <a:endParaRPr lang="pt-BR" sz="2400" dirty="0">
+              <a:latin typeface="Times New Roman" panose="02020603050405020304" pitchFamily="18" charset="0"/>
+              <a:cs typeface="Times New Roman" panose="02020603050405020304" pitchFamily="18" charset="0"/>
+            </a:endParaRPr>
+          </a:p>
+          <a:p>
+            <a:pPr marL="0" indent="0" algn="just">
+              <a:buNone/>
+            </a:pPr>
+            <a:endParaRPr lang="pt-BR" sz="2400" dirty="0">
+              <a:latin typeface="Calibri" panose="020F0502020204030204" pitchFamily="34" charset="0"/>
+            </a:endParaRPr>
+          </a:p>
+        </p:txBody>
+      </p:sp>
+    </p:spTree>
+    <p:extLst>
+      <p:ext uri="{BB962C8B-B14F-4D97-AF65-F5344CB8AC3E}">
+        <p14:creationId xmlns:p14="http://schemas.microsoft.com/office/powerpoint/2010/main" val="3680270425"/>
+      </p:ext>
+    </p:extLst>
+  </p:cSld>
+  <p:clrMapOvr>
+    <a:masterClrMapping/>
+  </p:clrMapOvr>
+  <p:transition spd="med"/>
+</p:sld>
+</file>
+
+<file path=ppt/slides/slide8.xml><?xml version="1.0" encoding="utf-8"?>
+<p:sld xmlns:a="http://schemas.openxmlformats.org/drawingml/2006/main" xmlns:r="http://schemas.openxmlformats.org/officeDocument/2006/relationships" xmlns:p="http://schemas.openxmlformats.org/presentationml/2006/main">
+  <p:cSld>
+    <p:spTree>
+      <p:nvGrpSpPr>
+        <p:cNvPr id="1" name=""/>
+        <p:cNvGrpSpPr/>
+        <p:nvPr/>
+      </p:nvGrpSpPr>
+      <p:grpSpPr>
+        <a:xfrm>
+          <a:off x="0" y="0"/>
+          <a:ext cx="0" cy="0"/>
+          <a:chOff x="0" y="0"/>
+          <a:chExt cx="0" cy="0"/>
+        </a:xfrm>
+      </p:grpSpPr>
+      <p:sp>
+        <p:nvSpPr>
+          <p:cNvPr id="6" name="Title 1"/>
+          <p:cNvSpPr>
+            <a:spLocks noGrp="1"/>
+          </p:cNvSpPr>
+          <p:nvPr>
+            <p:ph type="title"/>
+          </p:nvPr>
+        </p:nvSpPr>
+        <p:spPr>
+          <a:xfrm>
+            <a:off x="457200" y="205980"/>
+            <a:ext cx="8229600" cy="857251"/>
+          </a:xfrm>
+        </p:spPr>
+        <p:txBody>
+          <a:bodyPr>
+            <a:normAutofit/>
+          </a:bodyPr>
+          <a:lstStyle/>
+          <a:p>
+            <a:r>
+              <a:rPr lang="en-US" b="1" dirty="0" err="1">
+                <a:solidFill>
+                  <a:srgbClr val="0070C0"/>
+                </a:solidFill>
+              </a:rPr>
+              <a:t>Aprenda</a:t>
+            </a:r>
+            <a:r>
+              <a:rPr lang="en-US" b="1" dirty="0">
+                <a:solidFill>
+                  <a:srgbClr val="0070C0"/>
+                </a:solidFill>
+              </a:rPr>
+              <a:t>+</a:t>
+            </a:r>
+          </a:p>
+        </p:txBody>
+      </p:sp>
+      <p:sp>
+        <p:nvSpPr>
+          <p:cNvPr id="8" name="Text Placeholder 2"/>
+          <p:cNvSpPr>
+            <a:spLocks noGrp="1"/>
+          </p:cNvSpPr>
+          <p:nvPr>
+            <p:ph type="body" sz="half" idx="1"/>
+          </p:nvPr>
+        </p:nvSpPr>
+        <p:spPr>
+          <a:xfrm>
+            <a:off x="142865" y="1200150"/>
+            <a:ext cx="8865056" cy="3737370"/>
+          </a:xfrm>
+        </p:spPr>
+        <p:txBody>
+          <a:bodyPr>
+            <a:noAutofit/>
+          </a:bodyPr>
+          <a:lstStyle/>
+          <a:p>
+            <a:pPr marL="0" indent="0" algn="just">
+              <a:buNone/>
+            </a:pPr>
+            <a:r>
+              <a:rPr lang="pt-BR" sz="2400" dirty="0">
+                <a:latin typeface="Times New Roman" panose="02020603050405020304" pitchFamily="18" charset="0"/>
+                <a:cs typeface="Times New Roman" panose="02020603050405020304" pitchFamily="18" charset="0"/>
+              </a:rPr>
+              <a:t>[1] Plataformas de Middleware e de Comunicação para IOT em Python.</a:t>
+            </a:r>
+          </a:p>
+          <a:p>
+            <a:pPr marL="0" indent="0" algn="just">
+              <a:buNone/>
+            </a:pPr>
+            <a:r>
+              <a:rPr lang="pt-BR" sz="2400" b="1" dirty="0">
+                <a:solidFill>
+                  <a:srgbClr val="FF0000"/>
+                </a:solidFill>
+                <a:latin typeface="Times New Roman" panose="02020603050405020304" pitchFamily="18" charset="0"/>
+                <a:cs typeface="Times New Roman" panose="02020603050405020304" pitchFamily="18" charset="0"/>
+              </a:rPr>
+              <a:t>Disponível em: </a:t>
+            </a:r>
+            <a:r>
+              <a:rPr lang="pt-BR" sz="2400" dirty="0">
+                <a:latin typeface="Times New Roman" panose="02020603050405020304" pitchFamily="18" charset="0"/>
+                <a:cs typeface="Times New Roman" panose="02020603050405020304" pitchFamily="18" charset="0"/>
+                <a:hlinkClick r:id="rId3"/>
+              </a:rPr>
+              <a:t>https://</a:t>
+            </a:r>
+            <a:endParaRPr lang="pt-BR" sz="2400" dirty="0">
+              <a:latin typeface="Times New Roman" panose="02020603050405020304" pitchFamily="18" charset="0"/>
+              <a:cs typeface="Times New Roman" panose="02020603050405020304" pitchFamily="18" charset="0"/>
+            </a:endParaRPr>
+          </a:p>
+          <a:p>
+            <a:pPr marL="0" indent="0" algn="just">
+              <a:buNone/>
+            </a:pPr>
+            <a:endParaRPr lang="pt-BR" sz="2400" dirty="0">
+              <a:latin typeface="Times New Roman" panose="02020603050405020304" pitchFamily="18" charset="0"/>
+              <a:cs typeface="Times New Roman" panose="02020603050405020304" pitchFamily="18" charset="0"/>
+            </a:endParaRPr>
+          </a:p>
+          <a:p>
+            <a:pPr marL="0" indent="0" algn="just">
+              <a:buNone/>
+            </a:pPr>
+            <a:r>
+              <a:rPr lang="pt-BR" sz="2400" dirty="0">
+                <a:latin typeface="Times New Roman" panose="02020603050405020304" pitchFamily="18" charset="0"/>
+                <a:cs typeface="Times New Roman" panose="02020603050405020304" pitchFamily="18" charset="0"/>
+              </a:rPr>
+              <a:t>[2] Protocolos de Rede para IOT em Python. </a:t>
+            </a:r>
+          </a:p>
+          <a:p>
+            <a:pPr marL="0" indent="0" algn="just">
+              <a:buNone/>
+            </a:pPr>
+            <a:r>
+              <a:rPr lang="pt-BR" sz="2400" b="1" dirty="0">
+                <a:solidFill>
+                  <a:srgbClr val="FF0000"/>
+                </a:solidFill>
+                <a:latin typeface="Times New Roman" panose="02020603050405020304" pitchFamily="18" charset="0"/>
+                <a:cs typeface="Times New Roman" panose="02020603050405020304" pitchFamily="18" charset="0"/>
+              </a:rPr>
+              <a:t>Disponível em: </a:t>
+            </a:r>
+            <a:r>
+              <a:rPr lang="pt-BR" sz="2400" dirty="0">
+                <a:latin typeface="Times New Roman" panose="02020603050405020304" pitchFamily="18" charset="0"/>
+                <a:cs typeface="Times New Roman" panose="02020603050405020304" pitchFamily="18" charset="0"/>
+                <a:hlinkClick r:id="rId4"/>
+              </a:rPr>
+              <a:t>https://</a:t>
+            </a:r>
+            <a:endParaRPr lang="pt-BR" sz="2400" dirty="0">
+              <a:latin typeface="Times New Roman" panose="02020603050405020304" pitchFamily="18" charset="0"/>
+              <a:cs typeface="Times New Roman" panose="02020603050405020304" pitchFamily="18" charset="0"/>
+            </a:endParaRPr>
+          </a:p>
+          <a:p>
+            <a:pPr marL="0" indent="0" algn="just">
+              <a:buNone/>
+            </a:pPr>
+            <a:endParaRPr lang="pt-BR" sz="2400" dirty="0">
+              <a:latin typeface="Times New Roman" panose="02020603050405020304" pitchFamily="18" charset="0"/>
+              <a:cs typeface="Times New Roman" panose="02020603050405020304" pitchFamily="18" charset="0"/>
+            </a:endParaRPr>
+          </a:p>
+        </p:txBody>
+      </p:sp>
+    </p:spTree>
+    <p:extLst>
+      <p:ext uri="{BB962C8B-B14F-4D97-AF65-F5344CB8AC3E}">
+        <p14:creationId xmlns:p14="http://schemas.microsoft.com/office/powerpoint/2010/main" val="2747596967"/>
+      </p:ext>
+    </p:extLst>
+  </p:cSld>
+  <p:clrMapOvr>
+    <a:masterClrMapping/>
+  </p:clrMapOvr>
+  <p:transition spd="med"/>
+</p:sld>
+</file>
+
+<file path=ppt/slides/slide9.xml><?xml version="1.0" encoding="utf-8"?>
+<p:sld xmlns:a="http://schemas.openxmlformats.org/drawingml/2006/main" xmlns:r="http://schemas.openxmlformats.org/officeDocument/2006/relationships" xmlns:p="http://schemas.openxmlformats.org/presentationml/2006/main">
+  <p:cSld>
+    <p:spTree>
+      <p:nvGrpSpPr>
+        <p:cNvPr id="1" name=""/>
+        <p:cNvGrpSpPr/>
+        <p:nvPr/>
+      </p:nvGrpSpPr>
+      <p:grpSpPr>
+        <a:xfrm>
+          <a:off x="0" y="0"/>
+          <a:ext cx="0" cy="0"/>
+          <a:chOff x="0" y="0"/>
+          <a:chExt cx="0" cy="0"/>
+        </a:xfrm>
+      </p:grpSpPr>
+      <p:sp>
+        <p:nvSpPr>
+          <p:cNvPr id="6" name="Title 1"/>
+          <p:cNvSpPr>
+            <a:spLocks noGrp="1"/>
+          </p:cNvSpPr>
+          <p:nvPr>
+            <p:ph type="title"/>
+          </p:nvPr>
+        </p:nvSpPr>
+        <p:spPr>
+          <a:xfrm>
+            <a:off x="457200" y="205980"/>
+            <a:ext cx="8229600" cy="857251"/>
+          </a:xfrm>
+        </p:spPr>
+        <p:txBody>
+          <a:bodyPr>
+            <a:normAutofit/>
+          </a:bodyPr>
+          <a:lstStyle/>
+          <a:p>
+            <a:r>
+              <a:rPr lang="en-US" b="1" dirty="0" err="1">
+                <a:solidFill>
+                  <a:srgbClr val="0070C0"/>
+                </a:solidFill>
+              </a:rPr>
+              <a:t>Dinâmica</a:t>
+            </a:r>
+            <a:r>
+              <a:rPr lang="en-US" b="1" dirty="0">
+                <a:solidFill>
+                  <a:srgbClr val="0070C0"/>
+                </a:solidFill>
+              </a:rPr>
+              <a:t>/</a:t>
+            </a:r>
+            <a:r>
+              <a:rPr lang="en-US" b="1" dirty="0" err="1">
+                <a:solidFill>
+                  <a:srgbClr val="0070C0"/>
+                </a:solidFill>
+              </a:rPr>
+              <a:t>Atividades</a:t>
+            </a:r>
+            <a:endParaRPr lang="en-US" b="1" dirty="0">
+              <a:solidFill>
+                <a:srgbClr val="0070C0"/>
+              </a:solidFill>
+            </a:endParaRPr>
+          </a:p>
+        </p:txBody>
+      </p:sp>
+      <p:sp>
+        <p:nvSpPr>
+          <p:cNvPr id="8" name="Text Placeholder 2"/>
+          <p:cNvSpPr>
+            <a:spLocks noGrp="1"/>
+          </p:cNvSpPr>
+          <p:nvPr>
+            <p:ph type="body" sz="half" idx="1"/>
+          </p:nvPr>
+        </p:nvSpPr>
+        <p:spPr>
+          <a:xfrm>
+            <a:off x="139472" y="1063230"/>
+            <a:ext cx="8865056" cy="3606305"/>
+          </a:xfrm>
+        </p:spPr>
+        <p:txBody>
+          <a:bodyPr>
+            <a:noAutofit/>
+          </a:bodyPr>
+          <a:lstStyle/>
+          <a:p>
+            <a:pPr marL="0" indent="0" algn="just">
+              <a:buNone/>
+            </a:pPr>
+            <a:r>
+              <a:rPr lang="pt-BR" sz="2400" dirty="0">
+                <a:latin typeface="Times New Roman" panose="02020603050405020304" pitchFamily="18" charset="0"/>
+                <a:cs typeface="Times New Roman" panose="02020603050405020304" pitchFamily="18" charset="0"/>
+              </a:rPr>
+              <a:t>Exercícios (Atividade Verificadora de Aprendizagem)</a:t>
+            </a:r>
+          </a:p>
+          <a:p>
+            <a:pPr marL="0" indent="0" algn="just">
+              <a:buNone/>
+            </a:pPr>
+            <a:r>
+              <a:rPr lang="pt-BR" sz="2400" dirty="0">
+                <a:latin typeface="Times New Roman" panose="02020603050405020304" pitchFamily="18" charset="0"/>
+                <a:cs typeface="Times New Roman" panose="02020603050405020304" pitchFamily="18" charset="0"/>
+              </a:rPr>
+              <a:t> 	</a:t>
+            </a:r>
+          </a:p>
+          <a:p>
+            <a:pPr marL="0" indent="0" algn="just">
+              <a:buNone/>
+            </a:pPr>
+            <a:r>
+              <a:rPr lang="pt-BR" sz="2400" dirty="0">
+                <a:latin typeface="Times New Roman" panose="02020603050405020304" pitchFamily="18" charset="0"/>
+                <a:cs typeface="Times New Roman" panose="02020603050405020304" pitchFamily="18" charset="0"/>
+              </a:rPr>
+              <a:t>-- Plataforma </a:t>
+            </a:r>
+            <a:r>
+              <a:rPr lang="pt-BR" sz="2400" dirty="0" err="1">
+                <a:latin typeface="Times New Roman" panose="02020603050405020304" pitchFamily="18" charset="0"/>
+                <a:cs typeface="Times New Roman" panose="02020603050405020304" pitchFamily="18" charset="0"/>
+              </a:rPr>
+              <a:t>Netlify</a:t>
+            </a:r>
+            <a:r>
+              <a:rPr lang="pt-BR" sz="2400" dirty="0">
+                <a:latin typeface="Times New Roman" panose="02020603050405020304" pitchFamily="18" charset="0"/>
+                <a:cs typeface="Times New Roman" panose="02020603050405020304" pitchFamily="18" charset="0"/>
+              </a:rPr>
+              <a:t> (</a:t>
+            </a:r>
+            <a:r>
+              <a:rPr lang="pt-BR" sz="2400" dirty="0">
+                <a:latin typeface="Times New Roman" panose="02020603050405020304" pitchFamily="18" charset="0"/>
+                <a:cs typeface="Times New Roman" panose="02020603050405020304" pitchFamily="18" charset="0"/>
+                <a:hlinkClick r:id="rId3"/>
+              </a:rPr>
+              <a:t>https://www.netlify.com/</a:t>
+            </a:r>
+            <a:r>
+              <a:rPr lang="pt-BR" sz="2400" dirty="0">
+                <a:latin typeface="Times New Roman" panose="02020603050405020304" pitchFamily="18" charset="0"/>
+                <a:cs typeface="Times New Roman" panose="02020603050405020304" pitchFamily="18" charset="0"/>
+              </a:rPr>
+              <a:t>) / </a:t>
+            </a:r>
+            <a:r>
+              <a:rPr lang="pt-BR" sz="2400" dirty="0" err="1">
+                <a:latin typeface="Times New Roman" panose="02020603050405020304" pitchFamily="18" charset="0"/>
+                <a:cs typeface="Times New Roman" panose="02020603050405020304" pitchFamily="18" charset="0"/>
+              </a:rPr>
+              <a:t>Github</a:t>
+            </a:r>
+            <a:r>
+              <a:rPr lang="pt-BR" sz="2400" dirty="0">
+                <a:latin typeface="Times New Roman" panose="02020603050405020304" pitchFamily="18" charset="0"/>
+                <a:cs typeface="Times New Roman" panose="02020603050405020304" pitchFamily="18" charset="0"/>
+              </a:rPr>
+              <a:t> / </a:t>
+            </a:r>
+            <a:r>
+              <a:rPr lang="pt-BR" sz="2400" dirty="0" err="1">
+                <a:latin typeface="Times New Roman" panose="02020603050405020304" pitchFamily="18" charset="0"/>
+                <a:cs typeface="Times New Roman" panose="02020603050405020304" pitchFamily="18" charset="0"/>
+              </a:rPr>
+              <a:t>Git</a:t>
+            </a:r>
+            <a:endParaRPr lang="pt-BR" sz="2400" dirty="0">
+              <a:latin typeface="Times New Roman" panose="02020603050405020304" pitchFamily="18" charset="0"/>
+              <a:cs typeface="Times New Roman" panose="02020603050405020304" pitchFamily="18" charset="0"/>
+            </a:endParaRPr>
+          </a:p>
+          <a:p>
+            <a:pPr marL="0" indent="0" algn="just">
+              <a:buNone/>
+            </a:pPr>
+            <a:r>
+              <a:rPr lang="pt-BR" sz="2400" dirty="0">
+                <a:latin typeface="Times New Roman" panose="02020603050405020304" pitchFamily="18" charset="0"/>
+                <a:cs typeface="Times New Roman" panose="02020603050405020304" pitchFamily="18" charset="0"/>
+                <a:hlinkClick r:id="rId4"/>
+              </a:rPr>
+              <a:t>https://github.com/</a:t>
+            </a:r>
+            <a:r>
+              <a:rPr lang="pt-BR" sz="2400" dirty="0">
+                <a:latin typeface="Times New Roman" panose="02020603050405020304" pitchFamily="18" charset="0"/>
+                <a:cs typeface="Times New Roman" panose="02020603050405020304" pitchFamily="18" charset="0"/>
+              </a:rPr>
+              <a:t> ; </a:t>
+            </a:r>
+            <a:r>
+              <a:rPr lang="pt-BR" sz="2400" dirty="0">
+                <a:latin typeface="Times New Roman" panose="02020603050405020304" pitchFamily="18" charset="0"/>
+                <a:cs typeface="Times New Roman" panose="02020603050405020304" pitchFamily="18" charset="0"/>
+                <a:hlinkClick r:id="rId5"/>
+              </a:rPr>
+              <a:t>https://git-scm.com/downloads</a:t>
+            </a:r>
+            <a:endParaRPr lang="pt-BR" sz="2400" dirty="0">
+              <a:latin typeface="Times New Roman" panose="02020603050405020304" pitchFamily="18" charset="0"/>
+              <a:cs typeface="Times New Roman" panose="02020603050405020304" pitchFamily="18" charset="0"/>
+            </a:endParaRPr>
+          </a:p>
+          <a:p>
+            <a:pPr marL="0" indent="0" algn="just">
+              <a:buNone/>
+            </a:pPr>
+            <a:endParaRPr lang="pt-BR" sz="2400" dirty="0">
+              <a:latin typeface="Times New Roman" panose="02020603050405020304" pitchFamily="18" charset="0"/>
+              <a:cs typeface="Times New Roman" panose="02020603050405020304" pitchFamily="18" charset="0"/>
+            </a:endParaRPr>
+          </a:p>
+          <a:p>
+            <a:pPr marL="0" indent="0" algn="just">
+              <a:buNone/>
+            </a:pPr>
+            <a:r>
+              <a:rPr lang="pt-BR" sz="2400" dirty="0">
+                <a:latin typeface="Times New Roman" panose="02020603050405020304" pitchFamily="18" charset="0"/>
+                <a:cs typeface="Times New Roman" panose="02020603050405020304" pitchFamily="18" charset="0"/>
+              </a:rPr>
+              <a:t>Criar e </a:t>
+            </a:r>
+            <a:r>
+              <a:rPr lang="pt-BR" sz="2400" dirty="0" err="1">
+                <a:latin typeface="Times New Roman" panose="02020603050405020304" pitchFamily="18" charset="0"/>
+                <a:cs typeface="Times New Roman" panose="02020603050405020304" pitchFamily="18" charset="0"/>
+              </a:rPr>
+              <a:t>deploy</a:t>
+            </a:r>
+            <a:r>
+              <a:rPr lang="pt-BR" sz="2400" dirty="0">
+                <a:latin typeface="Times New Roman" panose="02020603050405020304" pitchFamily="18" charset="0"/>
+                <a:cs typeface="Times New Roman" panose="02020603050405020304" pitchFamily="18" charset="0"/>
+              </a:rPr>
+              <a:t> app teste</a:t>
+            </a:r>
+            <a:endParaRPr lang="pt-BR" sz="2400" dirty="0">
+              <a:latin typeface="Calibri" panose="020F0502020204030204" pitchFamily="34" charset="0"/>
+            </a:endParaRPr>
+          </a:p>
+        </p:txBody>
+      </p:sp>
+    </p:spTree>
+    <p:extLst>
+      <p:ext uri="{BB962C8B-B14F-4D97-AF65-F5344CB8AC3E}">
+        <p14:creationId xmlns:p14="http://schemas.microsoft.com/office/powerpoint/2010/main" val="1397642976"/>
+      </p:ext>
+    </p:extLst>
   </p:cSld>
   <p:clrMapOvr>
     <a:masterClrMapping/>

</xml_diff>

<commit_message>
aula 02 Cloud Indústria 4.0 atu IoT Python 14032023
</commit_message>
<xml_diff>
--- a/01 Classes/Aula 02 - Aplicação Cloud Indústria 40 Python.pptx
+++ b/01 Classes/Aula 02 - Aplicação Cloud Indústria 40 Python.pptx
@@ -5993,7 +5993,7 @@
               <a:t>e nativos da nuvem são aplicativos desenvolvidos a partir de </a:t>
             </a:r>
             <a:r>
-              <a:rPr lang="pt-BR" sz="2400" dirty="0" err="1">
+              <a:rPr lang="pt-BR" sz="2400" b="1" dirty="0" err="1">
                 <a:solidFill>
                   <a:schemeClr val="tx1"/>
                 </a:solidFill>
@@ -6418,6 +6418,22 @@
               <a:t> Open Shift</a:t>
             </a:r>
           </a:p>
+          <a:p>
+            <a:pPr algn="just">
+              <a:buFont typeface="Wingdings" panose="05000000000000000000" pitchFamily="2" charset="2"/>
+              <a:buChar char="§"/>
+            </a:pPr>
+            <a:r>
+              <a:rPr lang="pt-BR" sz="2400" dirty="0">
+                <a:solidFill>
+                  <a:schemeClr val="tx1"/>
+                </a:solidFill>
+                <a:latin typeface="Times New Roman" panose="02020603050405020304" pitchFamily="18" charset="0"/>
+                <a:cs typeface="Times New Roman" panose="02020603050405020304" pitchFamily="18" charset="0"/>
+              </a:rPr>
+              <a:t>Azure Microsoft</a:t>
+            </a:r>
+          </a:p>
         </p:txBody>
       </p:sp>
     </p:spTree>
@@ -7356,25 +7372,8 @@
                 <a:latin typeface="Times New Roman" panose="02020603050405020304" pitchFamily="18" charset="0"/>
                 <a:cs typeface="Times New Roman" panose="02020603050405020304" pitchFamily="18" charset="0"/>
               </a:rPr>
-              <a:t>Computação </a:t>
-            </a:r>
-            <a:r>
-              <a:rPr lang="pt-BR" sz="2000" dirty="0" err="1">
-                <a:solidFill>
-                  <a:schemeClr val="tx1"/>
-                </a:solidFill>
-                <a:latin typeface="Times New Roman" panose="02020603050405020304" pitchFamily="18" charset="0"/>
-                <a:cs typeface="Times New Roman" panose="02020603050405020304" pitchFamily="18" charset="0"/>
-              </a:rPr>
-              <a:t>coginitiva</a:t>
-            </a:r>
-            <a:endParaRPr lang="pt-BR" sz="2000" dirty="0">
-              <a:solidFill>
-                <a:schemeClr val="tx1"/>
-              </a:solidFill>
-              <a:latin typeface="Times New Roman" panose="02020603050405020304" pitchFamily="18" charset="0"/>
-              <a:cs typeface="Times New Roman" panose="02020603050405020304" pitchFamily="18" charset="0"/>
-            </a:endParaRPr>
+              <a:t>Computação Cognitiva</a:t>
+            </a:r>
           </a:p>
           <a:p>
             <a:pPr algn="just">
@@ -7883,8 +7882,21 @@
                   <a:schemeClr val="bg1"/>
                 </a:solidFill>
               </a:rPr>
-              <a:t>Plataformas Middleware,  Comunicação e Protocolos de Rede IOT</a:t>
-            </a:r>
+              <a:t>Plataformas Middleware,  Comunicação e Protocolos de Rede </a:t>
+            </a:r>
+            <a:r>
+              <a:rPr lang="pt-BR" sz="3600" b="1" dirty="0" err="1">
+                <a:solidFill>
+                  <a:schemeClr val="bg1"/>
+                </a:solidFill>
+              </a:rPr>
+              <a:t>IoT</a:t>
+            </a:r>
+            <a:endParaRPr lang="pt-BR" sz="3600" b="1" dirty="0">
+              <a:solidFill>
+                <a:schemeClr val="bg1"/>
+              </a:solidFill>
+            </a:endParaRPr>
           </a:p>
         </p:txBody>
       </p:sp>
@@ -8332,7 +8344,37 @@
                 <a:latin typeface="Times New Roman" panose="02020603050405020304" pitchFamily="18" charset="0"/>
                 <a:cs typeface="Times New Roman" panose="02020603050405020304" pitchFamily="18" charset="0"/>
               </a:rPr>
-              <a:t>Arduíno</a:t>
+              <a:t>Arduíno (</a:t>
+            </a:r>
+            <a:r>
+              <a:rPr lang="pt-BR" sz="2000" b="1" dirty="0">
+                <a:solidFill>
+                  <a:srgbClr val="FF0000"/>
+                </a:solidFill>
+                <a:latin typeface="Times New Roman" panose="02020603050405020304" pitchFamily="18" charset="0"/>
+                <a:cs typeface="Times New Roman" panose="02020603050405020304" pitchFamily="18" charset="0"/>
+              </a:rPr>
+              <a:t>Windows, Linux, Mac OS</a:t>
+            </a:r>
+            <a:r>
+              <a:rPr lang="pt-BR" sz="2000" dirty="0">
+                <a:solidFill>
+                  <a:schemeClr val="tx1"/>
+                </a:solidFill>
+                <a:latin typeface="Times New Roman" panose="02020603050405020304" pitchFamily="18" charset="0"/>
+                <a:cs typeface="Times New Roman" panose="02020603050405020304" pitchFamily="18" charset="0"/>
+              </a:rPr>
+              <a:t>). </a:t>
+            </a:r>
+            <a:r>
+              <a:rPr lang="pt-BR" sz="2000" b="1" dirty="0">
+                <a:solidFill>
+                  <a:schemeClr val="tx1"/>
+                </a:solidFill>
+                <a:latin typeface="Times New Roman" panose="02020603050405020304" pitchFamily="18" charset="0"/>
+                <a:cs typeface="Times New Roman" panose="02020603050405020304" pitchFamily="18" charset="0"/>
+              </a:rPr>
+              <a:t>microcontrolador Atmel AVR</a:t>
             </a:r>
           </a:p>
           <a:p>
@@ -8358,7 +8400,27 @@
                 <a:latin typeface="Times New Roman" panose="02020603050405020304" pitchFamily="18" charset="0"/>
                 <a:cs typeface="Times New Roman" panose="02020603050405020304" pitchFamily="18" charset="0"/>
               </a:rPr>
-              <a:t> PI</a:t>
+              <a:t> PI (</a:t>
+            </a:r>
+            <a:r>
+              <a:rPr lang="pt-BR" sz="2000" b="1" dirty="0">
+                <a:solidFill>
+                  <a:srgbClr val="FF0000"/>
+                </a:solidFill>
+                <a:latin typeface="Times New Roman" panose="02020603050405020304" pitchFamily="18" charset="0"/>
+                <a:cs typeface="Times New Roman" panose="02020603050405020304" pitchFamily="18" charset="0"/>
+              </a:rPr>
+              <a:t>Linux</a:t>
+            </a:r>
+            <a:r>
+              <a:rPr lang="pt-BR" sz="2000" dirty="0">
+                <a:solidFill>
+                  <a:schemeClr val="tx1"/>
+                </a:solidFill>
+                <a:latin typeface="Times New Roman" panose="02020603050405020304" pitchFamily="18" charset="0"/>
+                <a:cs typeface="Times New Roman" panose="02020603050405020304" pitchFamily="18" charset="0"/>
+              </a:rPr>
+              <a:t>)</a:t>
             </a:r>
           </a:p>
           <a:p>
@@ -8374,7 +8436,27 @@
                 <a:latin typeface="Times New Roman" panose="02020603050405020304" pitchFamily="18" charset="0"/>
                 <a:cs typeface="Times New Roman" panose="02020603050405020304" pitchFamily="18" charset="0"/>
               </a:rPr>
-              <a:t>Intel Edison</a:t>
+              <a:t>Intel Edison (</a:t>
+            </a:r>
+            <a:r>
+              <a:rPr lang="pt-BR" sz="2000" b="1" dirty="0">
+                <a:solidFill>
+                  <a:srgbClr val="FF0000"/>
+                </a:solidFill>
+                <a:latin typeface="Times New Roman" panose="02020603050405020304" pitchFamily="18" charset="0"/>
+                <a:cs typeface="Times New Roman" panose="02020603050405020304" pitchFamily="18" charset="0"/>
+              </a:rPr>
+              <a:t>Windows</a:t>
+            </a:r>
+            <a:r>
+              <a:rPr lang="pt-BR" sz="2000" dirty="0">
+                <a:solidFill>
+                  <a:schemeClr val="tx1"/>
+                </a:solidFill>
+                <a:latin typeface="Times New Roman" panose="02020603050405020304" pitchFamily="18" charset="0"/>
+                <a:cs typeface="Times New Roman" panose="02020603050405020304" pitchFamily="18" charset="0"/>
+              </a:rPr>
+              <a:t>)</a:t>
             </a:r>
           </a:p>
           <a:p>
@@ -8400,7 +8482,53 @@
                 <a:latin typeface="Times New Roman" panose="02020603050405020304" pitchFamily="18" charset="0"/>
                 <a:cs typeface="Times New Roman" panose="02020603050405020304" pitchFamily="18" charset="0"/>
               </a:rPr>
-              <a:t> (https://www.tinkercad.com/</a:t>
+              <a:t> (</a:t>
+            </a:r>
+            <a:r>
+              <a:rPr lang="pt-BR" sz="2000" b="1" dirty="0">
+                <a:solidFill>
+                  <a:srgbClr val="FF0000"/>
+                </a:solidFill>
+                <a:latin typeface="Times New Roman" panose="02020603050405020304" pitchFamily="18" charset="0"/>
+                <a:cs typeface="Times New Roman" panose="02020603050405020304" pitchFamily="18" charset="0"/>
+              </a:rPr>
+              <a:t>Arduíno</a:t>
+            </a:r>
+            <a:r>
+              <a:rPr lang="pt-BR" sz="2000" dirty="0">
+                <a:solidFill>
+                  <a:schemeClr val="tx1"/>
+                </a:solidFill>
+                <a:latin typeface="Times New Roman" panose="02020603050405020304" pitchFamily="18" charset="0"/>
+                <a:cs typeface="Times New Roman" panose="02020603050405020304" pitchFamily="18" charset="0"/>
+              </a:rPr>
+              <a:t>)</a:t>
+            </a:r>
+          </a:p>
+          <a:p>
+            <a:pPr marL="0" indent="0" algn="just">
+              <a:buNone/>
+            </a:pPr>
+            <a:r>
+              <a:rPr lang="pt-BR" sz="2000" dirty="0">
+                <a:solidFill>
+                  <a:schemeClr val="tx1"/>
+                </a:solidFill>
+                <a:latin typeface="Times New Roman" panose="02020603050405020304" pitchFamily="18" charset="0"/>
+                <a:cs typeface="Times New Roman" panose="02020603050405020304" pitchFamily="18" charset="0"/>
+              </a:rPr>
+              <a:t>	(</a:t>
+            </a:r>
+            <a:r>
+              <a:rPr lang="pt-BR" sz="2000" dirty="0">
+                <a:solidFill>
+                  <a:schemeClr val="tx1"/>
+                </a:solidFill>
+                <a:latin typeface="Times New Roman" panose="02020603050405020304" pitchFamily="18" charset="0"/>
+                <a:cs typeface="Times New Roman" panose="02020603050405020304" pitchFamily="18" charset="0"/>
+                <a:hlinkClick r:id="rId3"/>
+              </a:rPr>
+              <a:t>https://www.tinkercad.com/</a:t>
             </a:r>
             <a:r>
               <a:rPr lang="pt-BR" sz="2000" dirty="0" err="1">
@@ -8409,6 +8537,7 @@
                 </a:solidFill>
                 <a:latin typeface="Times New Roman" panose="02020603050405020304" pitchFamily="18" charset="0"/>
                 <a:cs typeface="Times New Roman" panose="02020603050405020304" pitchFamily="18" charset="0"/>
+                <a:hlinkClick r:id="rId3"/>
               </a:rPr>
               <a:t>things</a:t>
             </a:r>
@@ -8419,15 +8548,10 @@
                 </a:solidFill>
                 <a:latin typeface="Times New Roman" panose="02020603050405020304" pitchFamily="18" charset="0"/>
                 <a:cs typeface="Times New Roman" panose="02020603050405020304" pitchFamily="18" charset="0"/>
-              </a:rPr>
-              <a:t>/aSBH9ShfJ80-iot-project-)</a:t>
-            </a:r>
-          </a:p>
-          <a:p>
-            <a:pPr algn="just">
-              <a:buFont typeface="Wingdings" panose="05000000000000000000" pitchFamily="2" charset="2"/>
-              <a:buChar char="§"/>
-            </a:pPr>
+                <a:hlinkClick r:id="rId3"/>
+              </a:rPr>
+              <a:t>/aSBH9ShfJ80-iot-project-</a:t>
+            </a:r>
             <a:r>
               <a:rPr lang="pt-BR" sz="2000" dirty="0">
                 <a:solidFill>
@@ -8436,7 +8560,80 @@
                 <a:latin typeface="Times New Roman" panose="02020603050405020304" pitchFamily="18" charset="0"/>
                 <a:cs typeface="Times New Roman" panose="02020603050405020304" pitchFamily="18" charset="0"/>
               </a:rPr>
-              <a:t>THINGSBOARD</a:t>
+              <a:t>)</a:t>
+            </a:r>
+          </a:p>
+          <a:p>
+            <a:pPr marL="0" indent="0" algn="just">
+              <a:buNone/>
+            </a:pPr>
+            <a:endParaRPr lang="pt-BR" sz="2000" dirty="0">
+              <a:solidFill>
+                <a:schemeClr val="tx1"/>
+              </a:solidFill>
+              <a:latin typeface="Times New Roman" panose="02020603050405020304" pitchFamily="18" charset="0"/>
+              <a:cs typeface="Times New Roman" panose="02020603050405020304" pitchFamily="18" charset="0"/>
+            </a:endParaRPr>
+          </a:p>
+          <a:p>
+            <a:pPr marL="0" indent="0" algn="just">
+              <a:buNone/>
+            </a:pPr>
+            <a:r>
+              <a:rPr lang="pt-BR" sz="2000" b="1" dirty="0">
+                <a:solidFill>
+                  <a:srgbClr val="FF0000"/>
+                </a:solidFill>
+                <a:latin typeface="Times New Roman" panose="02020603050405020304" pitchFamily="18" charset="0"/>
+                <a:cs typeface="Times New Roman" panose="02020603050405020304" pitchFamily="18" charset="0"/>
+              </a:rPr>
+              <a:t>Outro Tipo de Plataforma</a:t>
+            </a:r>
+            <a:r>
+              <a:rPr lang="pt-BR" sz="2000" dirty="0">
+                <a:solidFill>
+                  <a:schemeClr val="tx1"/>
+                </a:solidFill>
+                <a:latin typeface="Times New Roman" panose="02020603050405020304" pitchFamily="18" charset="0"/>
+                <a:cs typeface="Times New Roman" panose="02020603050405020304" pitchFamily="18" charset="0"/>
+              </a:rPr>
+              <a:t>:</a:t>
+            </a:r>
+          </a:p>
+          <a:p>
+            <a:pPr marL="0" indent="0" algn="just">
+              <a:buNone/>
+            </a:pPr>
+            <a:r>
+              <a:rPr lang="pt-BR" sz="2000" dirty="0">
+                <a:solidFill>
+                  <a:schemeClr val="tx1"/>
+                </a:solidFill>
+                <a:latin typeface="Times New Roman" panose="02020603050405020304" pitchFamily="18" charset="0"/>
+                <a:cs typeface="Times New Roman" panose="02020603050405020304" pitchFamily="18" charset="0"/>
+              </a:rPr>
+              <a:t>	THINGSBOARD (</a:t>
+            </a:r>
+            <a:r>
+              <a:rPr lang="pt-BR" sz="2000" dirty="0">
+                <a:solidFill>
+                  <a:schemeClr val="tx1"/>
+                </a:solidFill>
+                <a:latin typeface="Times New Roman" panose="02020603050405020304" pitchFamily="18" charset="0"/>
+                <a:cs typeface="Times New Roman" panose="02020603050405020304" pitchFamily="18" charset="0"/>
+                <a:hlinkClick r:id="rId4"/>
+              </a:rPr>
+              <a:t>https://thingsboard.io/</a:t>
+            </a:r>
+            <a:r>
+              <a:rPr lang="pt-BR" sz="2000" dirty="0">
+                <a:solidFill>
+                  <a:schemeClr val="tx1"/>
+                </a:solidFill>
+                <a:latin typeface="Times New Roman" panose="02020603050405020304" pitchFamily="18" charset="0"/>
+                <a:cs typeface="Times New Roman" panose="02020603050405020304" pitchFamily="18" charset="0"/>
+              </a:rPr>
+              <a:t>)</a:t>
             </a:r>
           </a:p>
           <a:p>
@@ -9750,11 +9947,75 @@
               <a:buChar char="§"/>
             </a:pPr>
             <a:r>
+              <a:rPr lang="pt-BR" sz="2000" b="1" dirty="0" err="1">
+                <a:latin typeface="Times New Roman" panose="02020603050405020304" pitchFamily="18" charset="0"/>
+                <a:cs typeface="Times New Roman" panose="02020603050405020304" pitchFamily="18" charset="0"/>
+              </a:rPr>
+              <a:t>RESTful</a:t>
+            </a:r>
+            <a:r>
               <a:rPr lang="pt-BR" sz="2000" b="1" dirty="0">
                 <a:latin typeface="Times New Roman" panose="02020603050405020304" pitchFamily="18" charset="0"/>
                 <a:cs typeface="Times New Roman" panose="02020603050405020304" pitchFamily="18" charset="0"/>
               </a:rPr>
-              <a:t>RESTFUL HTTP </a:t>
+              <a:t> HTTP (</a:t>
+            </a:r>
+            <a:r>
+              <a:rPr lang="pt-BR" sz="2000" b="1" dirty="0" err="1">
+                <a:solidFill>
+                  <a:srgbClr val="FF0000"/>
+                </a:solidFill>
+                <a:latin typeface="Times New Roman" panose="02020603050405020304" pitchFamily="18" charset="0"/>
+                <a:cs typeface="Times New Roman" panose="02020603050405020304" pitchFamily="18" charset="0"/>
+              </a:rPr>
+              <a:t>representational</a:t>
+            </a:r>
+            <a:r>
+              <a:rPr lang="pt-BR" sz="2000" b="1" dirty="0">
+                <a:solidFill>
+                  <a:srgbClr val="FF0000"/>
+                </a:solidFill>
+                <a:latin typeface="Times New Roman" panose="02020603050405020304" pitchFamily="18" charset="0"/>
+                <a:cs typeface="Times New Roman" panose="02020603050405020304" pitchFamily="18" charset="0"/>
+              </a:rPr>
+              <a:t> </a:t>
+            </a:r>
+            <a:r>
+              <a:rPr lang="pt-BR" sz="2000" b="1" dirty="0" err="1">
+                <a:solidFill>
+                  <a:srgbClr val="FF0000"/>
+                </a:solidFill>
+                <a:latin typeface="Times New Roman" panose="02020603050405020304" pitchFamily="18" charset="0"/>
+                <a:cs typeface="Times New Roman" panose="02020603050405020304" pitchFamily="18" charset="0"/>
+              </a:rPr>
+              <a:t>state</a:t>
+            </a:r>
+            <a:r>
+              <a:rPr lang="pt-BR" sz="2000" b="1" dirty="0">
+                <a:solidFill>
+                  <a:srgbClr val="FF0000"/>
+                </a:solidFill>
+                <a:latin typeface="Times New Roman" panose="02020603050405020304" pitchFamily="18" charset="0"/>
+                <a:cs typeface="Times New Roman" panose="02020603050405020304" pitchFamily="18" charset="0"/>
+              </a:rPr>
+              <a:t> </a:t>
+            </a:r>
+            <a:r>
+              <a:rPr lang="pt-BR" sz="2000" b="1" dirty="0" err="1">
+                <a:solidFill>
+                  <a:srgbClr val="FF0000"/>
+                </a:solidFill>
+                <a:latin typeface="Times New Roman" panose="02020603050405020304" pitchFamily="18" charset="0"/>
+                <a:cs typeface="Times New Roman" panose="02020603050405020304" pitchFamily="18" charset="0"/>
+              </a:rPr>
+              <a:t>transfer</a:t>
+            </a:r>
+            <a:r>
+              <a:rPr lang="pt-BR" sz="2000" b="1" dirty="0">
+                <a:latin typeface="Times New Roman" panose="02020603050405020304" pitchFamily="18" charset="0"/>
+                <a:cs typeface="Times New Roman" panose="02020603050405020304" pitchFamily="18" charset="0"/>
+              </a:rPr>
+              <a:t>)</a:t>
             </a:r>
           </a:p>
           <a:p>
@@ -14010,32 +14271,51 @@
               <a:t>ORB (</a:t>
             </a:r>
             <a:r>
-              <a:rPr lang="pt-BR" sz="2400" dirty="0" err="1">
+              <a:rPr lang="pt-BR" sz="2400" b="1" dirty="0" err="1">
+                <a:solidFill>
+                  <a:srgbClr val="FF0000"/>
+                </a:solidFill>
                 <a:latin typeface="Times New Roman" panose="02020603050405020304" pitchFamily="18" charset="0"/>
                 <a:cs typeface="Times New Roman" panose="02020603050405020304" pitchFamily="18" charset="0"/>
               </a:rPr>
               <a:t>Object</a:t>
             </a:r>
             <a:r>
+              <a:rPr lang="pt-BR" sz="2400" b="1" dirty="0">
+                <a:solidFill>
+                  <a:srgbClr val="FF0000"/>
+                </a:solidFill>
+                <a:latin typeface="Times New Roman" panose="02020603050405020304" pitchFamily="18" charset="0"/>
+                <a:cs typeface="Times New Roman" panose="02020603050405020304" pitchFamily="18" charset="0"/>
+              </a:rPr>
+              <a:t> </a:t>
+            </a:r>
+            <a:r>
+              <a:rPr lang="pt-BR" sz="2400" b="1" dirty="0" err="1">
+                <a:solidFill>
+                  <a:srgbClr val="FF0000"/>
+                </a:solidFill>
+                <a:latin typeface="Times New Roman" panose="02020603050405020304" pitchFamily="18" charset="0"/>
+                <a:cs typeface="Times New Roman" panose="02020603050405020304" pitchFamily="18" charset="0"/>
+              </a:rPr>
+              <a:t>Request</a:t>
+            </a:r>
+            <a:r>
+              <a:rPr lang="pt-BR" sz="2400" b="1" dirty="0">
+                <a:solidFill>
+                  <a:srgbClr val="FF0000"/>
+                </a:solidFill>
+                <a:latin typeface="Times New Roman" panose="02020603050405020304" pitchFamily="18" charset="0"/>
+                <a:cs typeface="Times New Roman" panose="02020603050405020304" pitchFamily="18" charset="0"/>
+              </a:rPr>
+              <a:t> Broker</a:t>
+            </a:r>
+            <a:r>
               <a:rPr lang="pt-BR" sz="2400" dirty="0">
                 <a:latin typeface="Times New Roman" panose="02020603050405020304" pitchFamily="18" charset="0"/>
                 <a:cs typeface="Times New Roman" panose="02020603050405020304" pitchFamily="18" charset="0"/>
               </a:rPr>
-              <a:t> </a:t>
-            </a:r>
-            <a:r>
-              <a:rPr lang="pt-BR" sz="2400" dirty="0" err="1">
-                <a:latin typeface="Times New Roman" panose="02020603050405020304" pitchFamily="18" charset="0"/>
-                <a:cs typeface="Times New Roman" panose="02020603050405020304" pitchFamily="18" charset="0"/>
-              </a:rPr>
-              <a:t>Request</a:t>
-            </a:r>
-            <a:r>
-              <a:rPr lang="pt-BR" sz="2400" dirty="0">
-                <a:latin typeface="Times New Roman" panose="02020603050405020304" pitchFamily="18" charset="0"/>
-                <a:cs typeface="Times New Roman" panose="02020603050405020304" pitchFamily="18" charset="0"/>
-              </a:rPr>
-              <a:t> Broker) middleware de especificação CORBA (Common </a:t>
+              <a:t>) middleware de especificação CORBA (Common </a:t>
             </a:r>
             <a:r>
               <a:rPr lang="pt-BR" sz="2400" dirty="0" err="1">

</xml_diff>